<commit_message>
Add annFs, regionFs, simpleFs, ann_training (and everything in it) Update core, Upravljanje ra...
</commit_message>
<xml_diff>
--- a/Upravljanje računarom na osnovu pokreta snimljenih web kamerom.pptx
+++ b/Upravljanje računarom na osnovu pokreta snimljenih web kamerom.pptx
@@ -8,12 +8,17 @@
     <p:sldId id="257" r:id="rId2"/>
     <p:sldId id="258" r:id="rId3"/>
     <p:sldId id="261" r:id="rId4"/>
-    <p:sldId id="260" r:id="rId5"/>
-    <p:sldId id="266" r:id="rId6"/>
-    <p:sldId id="262" r:id="rId7"/>
-    <p:sldId id="263" r:id="rId8"/>
-    <p:sldId id="264" r:id="rId9"/>
-    <p:sldId id="265" r:id="rId10"/>
+    <p:sldId id="272" r:id="rId5"/>
+    <p:sldId id="268" r:id="rId6"/>
+    <p:sldId id="270" r:id="rId7"/>
+    <p:sldId id="269" r:id="rId8"/>
+    <p:sldId id="260" r:id="rId9"/>
+    <p:sldId id="266" r:id="rId10"/>
+    <p:sldId id="262" r:id="rId11"/>
+    <p:sldId id="263" r:id="rId12"/>
+    <p:sldId id="264" r:id="rId13"/>
+    <p:sldId id="265" r:id="rId14"/>
+    <p:sldId id="267" r:id="rId15"/>
   </p:sldIdLst>
   <p:sldSz cx="9144000" cy="6858000" type="screen4x3"/>
   <p:notesSz cx="6858000" cy="9144000"/>
@@ -124,6 +129,10 @@
           <p14:sldIdLst>
             <p14:sldId id="258"/>
             <p14:sldId id="261"/>
+            <p14:sldId id="272"/>
+            <p14:sldId id="268"/>
+            <p14:sldId id="270"/>
+            <p14:sldId id="269"/>
             <p14:sldId id="260"/>
             <p14:sldId id="266"/>
           </p14:sldIdLst>
@@ -142,6 +151,7 @@
           <p14:sldIdLst>
             <p14:sldId id="264"/>
             <p14:sldId id="265"/>
+            <p14:sldId id="267"/>
           </p14:sldIdLst>
         </p14:section>
       </p14:sectionLst>
@@ -331,7 +341,7 @@
           <a:p>
             <a:fld id="{B299E137-8870-4019-B9B1-E6313DA350D9}" type="datetimeFigureOut">
               <a:rPr lang="en-US" smtClean="0"/>
-              <a:t>12/16/2015</a:t>
+              <a:t>2/18/2016</a:t>
             </a:fld>
             <a:endParaRPr lang="en-US"/>
           </a:p>
@@ -501,7 +511,7 @@
           <a:p>
             <a:fld id="{B299E137-8870-4019-B9B1-E6313DA350D9}" type="datetimeFigureOut">
               <a:rPr lang="en-US" smtClean="0"/>
-              <a:t>12/16/2015</a:t>
+              <a:t>2/18/2016</a:t>
             </a:fld>
             <a:endParaRPr lang="en-US"/>
           </a:p>
@@ -681,7 +691,7 @@
           <a:p>
             <a:fld id="{B299E137-8870-4019-B9B1-E6313DA350D9}" type="datetimeFigureOut">
               <a:rPr lang="en-US" smtClean="0"/>
-              <a:t>12/16/2015</a:t>
+              <a:t>2/18/2016</a:t>
             </a:fld>
             <a:endParaRPr lang="en-US"/>
           </a:p>
@@ -851,7 +861,7 @@
           <a:p>
             <a:fld id="{B299E137-8870-4019-B9B1-E6313DA350D9}" type="datetimeFigureOut">
               <a:rPr lang="en-US" smtClean="0"/>
-              <a:t>12/16/2015</a:t>
+              <a:t>2/18/2016</a:t>
             </a:fld>
             <a:endParaRPr lang="en-US"/>
           </a:p>
@@ -1097,7 +1107,7 @@
           <a:p>
             <a:fld id="{B299E137-8870-4019-B9B1-E6313DA350D9}" type="datetimeFigureOut">
               <a:rPr lang="en-US" smtClean="0"/>
-              <a:t>12/16/2015</a:t>
+              <a:t>2/18/2016</a:t>
             </a:fld>
             <a:endParaRPr lang="en-US"/>
           </a:p>
@@ -1385,7 +1395,7 @@
           <a:p>
             <a:fld id="{B299E137-8870-4019-B9B1-E6313DA350D9}" type="datetimeFigureOut">
               <a:rPr lang="en-US" smtClean="0"/>
-              <a:t>12/16/2015</a:t>
+              <a:t>2/18/2016</a:t>
             </a:fld>
             <a:endParaRPr lang="en-US"/>
           </a:p>
@@ -1807,7 +1817,7 @@
           <a:p>
             <a:fld id="{B299E137-8870-4019-B9B1-E6313DA350D9}" type="datetimeFigureOut">
               <a:rPr lang="en-US" smtClean="0"/>
-              <a:t>12/16/2015</a:t>
+              <a:t>2/18/2016</a:t>
             </a:fld>
             <a:endParaRPr lang="en-US"/>
           </a:p>
@@ -1925,7 +1935,7 @@
           <a:p>
             <a:fld id="{B299E137-8870-4019-B9B1-E6313DA350D9}" type="datetimeFigureOut">
               <a:rPr lang="en-US" smtClean="0"/>
-              <a:t>12/16/2015</a:t>
+              <a:t>2/18/2016</a:t>
             </a:fld>
             <a:endParaRPr lang="en-US"/>
           </a:p>
@@ -2020,7 +2030,7 @@
           <a:p>
             <a:fld id="{B299E137-8870-4019-B9B1-E6313DA350D9}" type="datetimeFigureOut">
               <a:rPr lang="en-US" smtClean="0"/>
-              <a:t>12/16/2015</a:t>
+              <a:t>2/18/2016</a:t>
             </a:fld>
             <a:endParaRPr lang="en-US"/>
           </a:p>
@@ -2297,7 +2307,7 @@
           <a:p>
             <a:fld id="{B299E137-8870-4019-B9B1-E6313DA350D9}" type="datetimeFigureOut">
               <a:rPr lang="en-US" smtClean="0"/>
-              <a:t>12/16/2015</a:t>
+              <a:t>2/18/2016</a:t>
             </a:fld>
             <a:endParaRPr lang="en-US"/>
           </a:p>
@@ -2550,7 +2560,7 @@
           <a:p>
             <a:fld id="{B299E137-8870-4019-B9B1-E6313DA350D9}" type="datetimeFigureOut">
               <a:rPr lang="en-US" smtClean="0"/>
-              <a:t>12/16/2015</a:t>
+              <a:t>2/18/2016</a:t>
             </a:fld>
             <a:endParaRPr lang="en-US"/>
           </a:p>
@@ -2763,7 +2773,7 @@
           <a:p>
             <a:fld id="{B299E137-8870-4019-B9B1-E6313DA350D9}" type="datetimeFigureOut">
               <a:rPr lang="en-US" smtClean="0"/>
-              <a:t>12/16/2015</a:t>
+              <a:t>2/18/2016</a:t>
             </a:fld>
             <a:endParaRPr lang="en-US"/>
           </a:p>
@@ -3459,6 +3469,962 @@
 </p:sld>
 </file>
 
+<file path=ppt/slides/slide10.xml><?xml version="1.0" encoding="utf-8"?>
+<p:sld xmlns:a="http://schemas.openxmlformats.org/drawingml/2006/main" xmlns:r="http://schemas.openxmlformats.org/officeDocument/2006/relationships" xmlns:p="http://schemas.openxmlformats.org/presentationml/2006/main">
+  <p:cSld>
+    <p:spTree>
+      <p:nvGrpSpPr>
+        <p:cNvPr id="1" name=""/>
+        <p:cNvGrpSpPr/>
+        <p:nvPr/>
+      </p:nvGrpSpPr>
+      <p:grpSpPr>
+        <a:xfrm>
+          <a:off x="0" y="0"/>
+          <a:ext cx="0" cy="0"/>
+          <a:chOff x="0" y="0"/>
+          <a:chExt cx="0" cy="0"/>
+        </a:xfrm>
+      </p:grpSpPr>
+      <p:sp>
+        <p:nvSpPr>
+          <p:cNvPr id="2" name="Title 1"/>
+          <p:cNvSpPr>
+            <a:spLocks noGrp="1"/>
+          </p:cNvSpPr>
+          <p:nvPr>
+            <p:ph type="title"/>
+          </p:nvPr>
+        </p:nvSpPr>
+        <p:spPr/>
+        <p:txBody>
+          <a:bodyPr/>
+          <a:lstStyle/>
+          <a:p>
+            <a:r>
+              <a:rPr lang="sr-Latn-RS" dirty="0" smtClean="0"/>
+              <a:t>Motivacija</a:t>
+            </a:r>
+            <a:endParaRPr lang="en-US" dirty="0"/>
+          </a:p>
+        </p:txBody>
+      </p:sp>
+      <p:sp>
+        <p:nvSpPr>
+          <p:cNvPr id="3" name="Content Placeholder 2"/>
+          <p:cNvSpPr>
+            <a:spLocks noGrp="1"/>
+          </p:cNvSpPr>
+          <p:nvPr>
+            <p:ph idx="1"/>
+          </p:nvPr>
+        </p:nvSpPr>
+        <p:spPr/>
+        <p:txBody>
+          <a:bodyPr/>
+          <a:lstStyle/>
+          <a:p>
+            <a:r>
+              <a:rPr lang="en-US" dirty="0" err="1" smtClean="0"/>
+              <a:t>Pomeranje</a:t>
+            </a:r>
+            <a:r>
+              <a:rPr lang="en-US" dirty="0" smtClean="0"/>
+              <a:t> </a:t>
+            </a:r>
+            <a:r>
+              <a:rPr lang="en-US" dirty="0" err="1" smtClean="0"/>
+              <a:t>objekata</a:t>
+            </a:r>
+            <a:r>
+              <a:rPr lang="en-US" dirty="0" smtClean="0"/>
+              <a:t> </a:t>
+            </a:r>
+            <a:r>
+              <a:rPr lang="en-US" dirty="0" err="1" smtClean="0"/>
+              <a:t>kori</a:t>
+            </a:r>
+            <a:r>
+              <a:rPr lang="sr-Latn-RS" dirty="0" smtClean="0"/>
+              <a:t>šćenjem „sile“ u filmovima Star Wars (Force)</a:t>
+            </a:r>
+            <a:endParaRPr lang="en-US" dirty="0"/>
+          </a:p>
+        </p:txBody>
+      </p:sp>
+    </p:spTree>
+    <p:extLst>
+      <p:ext uri="{BB962C8B-B14F-4D97-AF65-F5344CB8AC3E}">
+        <p14:creationId xmlns:p14="http://schemas.microsoft.com/office/powerpoint/2010/main" val="958847051"/>
+      </p:ext>
+    </p:extLst>
+  </p:cSld>
+  <p:clrMapOvr>
+    <a:masterClrMapping/>
+  </p:clrMapOvr>
+  <p:timing>
+    <p:tnLst>
+      <p:par>
+        <p:cTn id="1" dur="indefinite" restart="never" nodeType="tmRoot"/>
+      </p:par>
+    </p:tnLst>
+  </p:timing>
+</p:sld>
+</file>
+
+<file path=ppt/slides/slide11.xml><?xml version="1.0" encoding="utf-8"?>
+<p:sld xmlns:a="http://schemas.openxmlformats.org/drawingml/2006/main" xmlns:r="http://schemas.openxmlformats.org/officeDocument/2006/relationships" xmlns:p="http://schemas.openxmlformats.org/presentationml/2006/main">
+  <p:cSld>
+    <p:spTree>
+      <p:nvGrpSpPr>
+        <p:cNvPr id="1" name=""/>
+        <p:cNvGrpSpPr/>
+        <p:nvPr/>
+      </p:nvGrpSpPr>
+      <p:grpSpPr>
+        <a:xfrm>
+          <a:off x="0" y="0"/>
+          <a:ext cx="0" cy="0"/>
+          <a:chOff x="0" y="0"/>
+          <a:chExt cx="0" cy="0"/>
+        </a:xfrm>
+      </p:grpSpPr>
+      <p:sp>
+        <p:nvSpPr>
+          <p:cNvPr id="2" name="Title 1"/>
+          <p:cNvSpPr>
+            <a:spLocks noGrp="1"/>
+          </p:cNvSpPr>
+          <p:nvPr>
+            <p:ph type="title"/>
+          </p:nvPr>
+        </p:nvSpPr>
+        <p:spPr/>
+        <p:txBody>
+          <a:bodyPr>
+            <a:normAutofit fontScale="90000"/>
+          </a:bodyPr>
+          <a:lstStyle/>
+          <a:p>
+            <a:r>
+              <a:rPr lang="en-US" dirty="0" err="1" smtClean="0"/>
+              <a:t>Sli</a:t>
+            </a:r>
+            <a:r>
+              <a:rPr lang="sr-Latn-RS" dirty="0" smtClean="0"/>
+              <a:t>čna rešenja (</a:t>
+            </a:r>
+            <a:r>
+              <a:rPr lang="en-US" dirty="0" err="1" smtClean="0"/>
+              <a:t>istrazi</a:t>
+            </a:r>
+            <a:r>
+              <a:rPr lang="en-US" dirty="0" smtClean="0"/>
+              <a:t> </a:t>
+            </a:r>
+            <a:r>
+              <a:rPr lang="en-US" dirty="0" err="1" smtClean="0"/>
+              <a:t>kako</a:t>
+            </a:r>
+            <a:r>
+              <a:rPr lang="en-US" dirty="0" smtClean="0"/>
+              <a:t> </a:t>
+            </a:r>
+            <a:r>
+              <a:rPr lang="en-US" dirty="0" err="1" smtClean="0"/>
+              <a:t>rade</a:t>
+            </a:r>
+            <a:r>
+              <a:rPr lang="en-US" dirty="0" smtClean="0"/>
+              <a:t> i </a:t>
+            </a:r>
+            <a:r>
+              <a:rPr lang="en-US" dirty="0" err="1" smtClean="0"/>
+              <a:t>opisi</a:t>
+            </a:r>
+            <a:r>
+              <a:rPr lang="en-US" dirty="0" smtClean="0"/>
+              <a:t>)</a:t>
+            </a:r>
+            <a:endParaRPr lang="en-US" dirty="0"/>
+          </a:p>
+        </p:txBody>
+      </p:sp>
+      <p:sp>
+        <p:nvSpPr>
+          <p:cNvPr id="3" name="Content Placeholder 2"/>
+          <p:cNvSpPr>
+            <a:spLocks noGrp="1"/>
+          </p:cNvSpPr>
+          <p:nvPr>
+            <p:ph idx="1"/>
+          </p:nvPr>
+        </p:nvSpPr>
+        <p:spPr/>
+        <p:txBody>
+          <a:bodyPr/>
+          <a:lstStyle/>
+          <a:p>
+            <a:r>
+              <a:rPr lang="sr-Latn-RS" dirty="0" smtClean="0"/>
+              <a:t>Hovering Controls za smart telefone</a:t>
+            </a:r>
+          </a:p>
+          <a:p>
+            <a:pPr marL="0" indent="0">
+              <a:buNone/>
+            </a:pPr>
+            <a:r>
+              <a:rPr lang="en-US" sz="1600" dirty="0" smtClean="0">
+                <a:solidFill>
+                  <a:schemeClr val="accent1"/>
+                </a:solidFill>
+                <a:hlinkClick r:id="rId2"/>
+              </a:rPr>
+              <a:t>http</a:t>
+            </a:r>
+            <a:r>
+              <a:rPr lang="en-US" sz="1800" dirty="0" smtClean="0">
+                <a:solidFill>
+                  <a:schemeClr val="accent1"/>
+                </a:solidFill>
+                <a:hlinkClick r:id="rId2"/>
+              </a:rPr>
+              <a:t>://</a:t>
+            </a:r>
+            <a:r>
+              <a:rPr lang="en-US" sz="1600" dirty="0" smtClean="0">
+                <a:solidFill>
+                  <a:schemeClr val="accent1"/>
+                </a:solidFill>
+                <a:hlinkClick r:id="rId2"/>
+              </a:rPr>
+              <a:t>forum.xda-developers.com/showthread.php?t=2351974</a:t>
+            </a:r>
+            <a:endParaRPr lang="sr-Latn-RS" sz="1800" dirty="0" smtClean="0">
+              <a:solidFill>
+                <a:schemeClr val="accent1"/>
+              </a:solidFill>
+            </a:endParaRPr>
+          </a:p>
+          <a:p>
+            <a:pPr marL="0" indent="0">
+              <a:buNone/>
+            </a:pPr>
+            <a:r>
+              <a:rPr lang="en-US" sz="1600" dirty="0" smtClean="0">
+                <a:solidFill>
+                  <a:schemeClr val="accent1"/>
+                </a:solidFill>
+                <a:hlinkClick r:id="rId3"/>
+              </a:rPr>
+              <a:t>https://play.google.com/store/apps/details?id=com.golgorz.hoveringcontrols</a:t>
+            </a:r>
+            <a:endParaRPr lang="en-US" sz="1600" dirty="0" smtClean="0">
+              <a:solidFill>
+                <a:schemeClr val="accent1"/>
+              </a:solidFill>
+            </a:endParaRPr>
+          </a:p>
+          <a:p>
+            <a:r>
+              <a:rPr lang="sr-Latn-RS" dirty="0" smtClean="0"/>
+              <a:t>Samsung Smart TV Motion Control</a:t>
+            </a:r>
+            <a:endParaRPr lang="en-US" dirty="0" smtClean="0"/>
+          </a:p>
+          <a:p>
+            <a:pPr marL="0" indent="0">
+              <a:buNone/>
+            </a:pPr>
+            <a:r>
+              <a:rPr lang="en-US" sz="1600" dirty="0" smtClean="0">
+                <a:hlinkClick r:id="rId4"/>
+              </a:rPr>
+              <a:t>http://www.samsung.com/my/microsite/tv/2013_si/motion_control_ex_gesture.html</a:t>
+            </a:r>
+            <a:endParaRPr lang="en-US" sz="1600" dirty="0" smtClean="0"/>
+          </a:p>
+          <a:p>
+            <a:r>
+              <a:rPr lang="en-US" dirty="0" smtClean="0"/>
+              <a:t>Leap Motion</a:t>
+            </a:r>
+          </a:p>
+          <a:p>
+            <a:pPr marL="0" indent="0">
+              <a:buNone/>
+            </a:pPr>
+            <a:r>
+              <a:rPr lang="en-US" sz="1600" dirty="0" smtClean="0">
+                <a:hlinkClick r:id="rId5"/>
+              </a:rPr>
+              <a:t>https://www.leapmotion.com/</a:t>
+            </a:r>
+            <a:endParaRPr lang="en-US" sz="1600" dirty="0" smtClean="0"/>
+          </a:p>
+          <a:p>
+            <a:pPr marL="0" indent="0">
+              <a:buNone/>
+            </a:pPr>
+            <a:endParaRPr lang="en-US" dirty="0"/>
+          </a:p>
+        </p:txBody>
+      </p:sp>
+    </p:spTree>
+    <p:extLst>
+      <p:ext uri="{BB962C8B-B14F-4D97-AF65-F5344CB8AC3E}">
+        <p14:creationId xmlns:p14="http://schemas.microsoft.com/office/powerpoint/2010/main" val="3989313053"/>
+      </p:ext>
+    </p:extLst>
+  </p:cSld>
+  <p:clrMapOvr>
+    <a:masterClrMapping/>
+  </p:clrMapOvr>
+</p:sld>
+</file>
+
+<file path=ppt/slides/slide12.xml><?xml version="1.0" encoding="utf-8"?>
+<p:sld xmlns:a="http://schemas.openxmlformats.org/drawingml/2006/main" xmlns:r="http://schemas.openxmlformats.org/officeDocument/2006/relationships" xmlns:p="http://schemas.openxmlformats.org/presentationml/2006/main">
+  <p:cSld>
+    <p:spTree>
+      <p:nvGrpSpPr>
+        <p:cNvPr id="1" name=""/>
+        <p:cNvGrpSpPr/>
+        <p:nvPr/>
+      </p:nvGrpSpPr>
+      <p:grpSpPr>
+        <a:xfrm>
+          <a:off x="0" y="0"/>
+          <a:ext cx="0" cy="0"/>
+          <a:chOff x="0" y="0"/>
+          <a:chExt cx="0" cy="0"/>
+        </a:xfrm>
+      </p:grpSpPr>
+      <p:sp>
+        <p:nvSpPr>
+          <p:cNvPr id="2" name="Title 1"/>
+          <p:cNvSpPr>
+            <a:spLocks noGrp="1"/>
+          </p:cNvSpPr>
+          <p:nvPr>
+            <p:ph type="title"/>
+          </p:nvPr>
+        </p:nvSpPr>
+        <p:spPr/>
+        <p:txBody>
+          <a:bodyPr>
+            <a:normAutofit fontScale="90000"/>
+          </a:bodyPr>
+          <a:lstStyle/>
+          <a:p>
+            <a:r>
+              <a:rPr lang="en-US" dirty="0" err="1" smtClean="0"/>
+              <a:t>Koraci</a:t>
+            </a:r>
+            <a:r>
+              <a:rPr lang="en-US" dirty="0" smtClean="0"/>
+              <a:t> </a:t>
+            </a:r>
+            <a:r>
+              <a:rPr lang="en-US" dirty="0" err="1" smtClean="0"/>
+              <a:t>implementacije</a:t>
+            </a:r>
+            <a:r>
+              <a:rPr lang="en-US" dirty="0" smtClean="0"/>
+              <a:t/>
+            </a:r>
+            <a:br>
+              <a:rPr lang="en-US" dirty="0" smtClean="0"/>
+            </a:br>
+            <a:r>
+              <a:rPr lang="en-US" dirty="0" smtClean="0"/>
+              <a:t>(</a:t>
+            </a:r>
+            <a:r>
+              <a:rPr lang="en-US" dirty="0" err="1" smtClean="0"/>
+              <a:t>kopiraj</a:t>
+            </a:r>
+            <a:r>
+              <a:rPr lang="en-US" dirty="0" smtClean="0"/>
+              <a:t> </a:t>
+            </a:r>
+            <a:r>
+              <a:rPr lang="en-US" dirty="0" err="1" smtClean="0"/>
+              <a:t>znacajne</a:t>
+            </a:r>
+            <a:r>
+              <a:rPr lang="en-US" dirty="0" smtClean="0"/>
+              <a:t> </a:t>
+            </a:r>
+            <a:r>
+              <a:rPr lang="en-US" dirty="0" err="1" smtClean="0"/>
+              <a:t>delove</a:t>
+            </a:r>
+            <a:r>
+              <a:rPr lang="en-US" dirty="0" smtClean="0"/>
+              <a:t> </a:t>
+            </a:r>
+            <a:r>
+              <a:rPr lang="en-US" dirty="0" err="1" smtClean="0"/>
+              <a:t>koda</a:t>
+            </a:r>
+            <a:r>
+              <a:rPr lang="en-US" dirty="0" smtClean="0"/>
+              <a:t> i </a:t>
+            </a:r>
+            <a:r>
+              <a:rPr lang="en-US" dirty="0" err="1" smtClean="0"/>
+              <a:t>objasni</a:t>
+            </a:r>
+            <a:r>
+              <a:rPr lang="en-US" dirty="0" smtClean="0"/>
+              <a:t>)</a:t>
+            </a:r>
+            <a:endParaRPr lang="en-US" dirty="0"/>
+          </a:p>
+        </p:txBody>
+      </p:sp>
+      <p:sp>
+        <p:nvSpPr>
+          <p:cNvPr id="3" name="Content Placeholder 2"/>
+          <p:cNvSpPr>
+            <a:spLocks noGrp="1"/>
+          </p:cNvSpPr>
+          <p:nvPr>
+            <p:ph idx="1"/>
+          </p:nvPr>
+        </p:nvSpPr>
+        <p:spPr/>
+        <p:txBody>
+          <a:bodyPr>
+            <a:normAutofit/>
+          </a:bodyPr>
+          <a:lstStyle/>
+          <a:p>
+            <a:pPr marL="514350" indent="-514350">
+              <a:buFont typeface="+mj-lt"/>
+              <a:buAutoNum type="arabicPeriod"/>
+            </a:pPr>
+            <a:r>
+              <a:rPr lang="en-US" dirty="0" err="1" smtClean="0"/>
+              <a:t>Obu</a:t>
+            </a:r>
+            <a:r>
+              <a:rPr lang="sr-Latn-RS" dirty="0" smtClean="0"/>
+              <a:t>čiti veštačku neuronsku mrežu</a:t>
+            </a:r>
+            <a:endParaRPr lang="en-US" dirty="0" smtClean="0"/>
+          </a:p>
+          <a:p>
+            <a:pPr marL="514350" indent="-514350">
+              <a:buFont typeface="+mj-lt"/>
+              <a:buAutoNum type="arabicPeriod"/>
+            </a:pPr>
+            <a:r>
+              <a:rPr lang="en-US" dirty="0" err="1" smtClean="0"/>
+              <a:t>Zatra</a:t>
+            </a:r>
+            <a:r>
+              <a:rPr lang="sr-Latn-RS" dirty="0" smtClean="0"/>
+              <a:t>žiti od web kamere da počne da snima</a:t>
+            </a:r>
+          </a:p>
+          <a:p>
+            <a:pPr marL="514350" indent="-514350">
+              <a:buFont typeface="+mj-lt"/>
+              <a:buAutoNum type="arabicPeriod"/>
+            </a:pPr>
+            <a:r>
+              <a:rPr lang="sr-Latn-RS" dirty="0" smtClean="0"/>
+              <a:t>Čitati frejmove iz snimka kamere (realtime)</a:t>
+            </a:r>
+          </a:p>
+          <a:p>
+            <a:pPr marL="514350" indent="-514350">
+              <a:buFont typeface="+mj-lt"/>
+              <a:buAutoNum type="arabicPeriod"/>
+            </a:pPr>
+            <a:r>
+              <a:rPr lang="sr-Latn-RS" dirty="0" smtClean="0"/>
+              <a:t>Konvertovati svaki frejm u binarnu sliku</a:t>
+            </a:r>
+          </a:p>
+          <a:p>
+            <a:pPr marL="514350" indent="-514350">
+              <a:buFont typeface="+mj-lt"/>
+              <a:buAutoNum type="arabicPeriod"/>
+            </a:pPr>
+            <a:r>
+              <a:rPr lang="sr-Latn-RS" dirty="0" smtClean="0"/>
+              <a:t>Pronaći region od interesa (konveksnu „ljusku“ šake)</a:t>
+            </a:r>
+            <a:endParaRPr lang="en-US" dirty="0" smtClean="0"/>
+          </a:p>
+          <a:p>
+            <a:pPr marL="514350" indent="-514350">
+              <a:buFont typeface="+mj-lt"/>
+              <a:buAutoNum type="arabicPeriod"/>
+            </a:pPr>
+            <a:r>
+              <a:rPr lang="en-US" dirty="0" err="1" smtClean="0"/>
+              <a:t>Proslediti</a:t>
+            </a:r>
+            <a:r>
+              <a:rPr lang="en-US" dirty="0" smtClean="0"/>
+              <a:t> region </a:t>
+            </a:r>
+            <a:r>
+              <a:rPr lang="en-US" dirty="0" err="1" smtClean="0"/>
+              <a:t>neuronskoj</a:t>
+            </a:r>
+            <a:r>
+              <a:rPr lang="en-US" dirty="0" smtClean="0"/>
+              <a:t> </a:t>
+            </a:r>
+            <a:r>
+              <a:rPr lang="en-US" dirty="0" err="1" smtClean="0"/>
+              <a:t>mre</a:t>
+            </a:r>
+            <a:r>
+              <a:rPr lang="sr-Latn-RS" dirty="0" smtClean="0"/>
+              <a:t>ži da bi odlučila koja je ruka i gestura u pitanju</a:t>
+            </a:r>
+          </a:p>
+        </p:txBody>
+      </p:sp>
+    </p:spTree>
+    <p:extLst>
+      <p:ext uri="{BB962C8B-B14F-4D97-AF65-F5344CB8AC3E}">
+        <p14:creationId xmlns:p14="http://schemas.microsoft.com/office/powerpoint/2010/main" val="1440826449"/>
+      </p:ext>
+    </p:extLst>
+  </p:cSld>
+  <p:clrMapOvr>
+    <a:masterClrMapping/>
+  </p:clrMapOvr>
+</p:sld>
+</file>
+
+<file path=ppt/slides/slide13.xml><?xml version="1.0" encoding="utf-8"?>
+<p:sld xmlns:a="http://schemas.openxmlformats.org/drawingml/2006/main" xmlns:r="http://schemas.openxmlformats.org/officeDocument/2006/relationships" xmlns:p="http://schemas.openxmlformats.org/presentationml/2006/main">
+  <p:cSld>
+    <p:spTree>
+      <p:nvGrpSpPr>
+        <p:cNvPr id="1" name=""/>
+        <p:cNvGrpSpPr/>
+        <p:nvPr/>
+      </p:nvGrpSpPr>
+      <p:grpSpPr>
+        <a:xfrm>
+          <a:off x="0" y="0"/>
+          <a:ext cx="0" cy="0"/>
+          <a:chOff x="0" y="0"/>
+          <a:chExt cx="0" cy="0"/>
+        </a:xfrm>
+      </p:grpSpPr>
+      <p:sp>
+        <p:nvSpPr>
+          <p:cNvPr id="2" name="Title 1"/>
+          <p:cNvSpPr>
+            <a:spLocks noGrp="1"/>
+          </p:cNvSpPr>
+          <p:nvPr>
+            <p:ph type="title"/>
+          </p:nvPr>
+        </p:nvSpPr>
+        <p:spPr/>
+        <p:txBody>
+          <a:bodyPr/>
+          <a:lstStyle/>
+          <a:p>
+            <a:r>
+              <a:rPr lang="sr-Latn-RS" dirty="0" smtClean="0"/>
+              <a:t>Koraci implementacije</a:t>
+            </a:r>
+            <a:endParaRPr lang="en-US" dirty="0"/>
+          </a:p>
+        </p:txBody>
+      </p:sp>
+      <p:sp>
+        <p:nvSpPr>
+          <p:cNvPr id="3" name="Content Placeholder 2"/>
+          <p:cNvSpPr>
+            <a:spLocks noGrp="1"/>
+          </p:cNvSpPr>
+          <p:nvPr>
+            <p:ph idx="1"/>
+          </p:nvPr>
+        </p:nvSpPr>
+        <p:spPr/>
+        <p:txBody>
+          <a:bodyPr>
+            <a:normAutofit lnSpcReduction="10000"/>
+          </a:bodyPr>
+          <a:lstStyle/>
+          <a:p>
+            <a:pPr marL="514350" indent="-514350">
+              <a:buFont typeface="+mj-lt"/>
+              <a:buAutoNum type="arabicPeriod" startAt="6"/>
+            </a:pPr>
+            <a:r>
+              <a:rPr lang="sr-Latn-RS" dirty="0"/>
+              <a:t>Sračunati razlike u poziciji i veličini regiona između </a:t>
+            </a:r>
+            <a:r>
+              <a:rPr lang="sr-Latn-RS" dirty="0" smtClean="0"/>
+              <a:t>frejmova</a:t>
+            </a:r>
+          </a:p>
+          <a:p>
+            <a:pPr marL="514350" indent="-514350">
+              <a:buFont typeface="+mj-lt"/>
+              <a:buAutoNum type="arabicPeriod" startAt="6"/>
+            </a:pPr>
+            <a:r>
+              <a:rPr lang="sr-Latn-RS" dirty="0" smtClean="0"/>
+              <a:t>Ako postoji razlika u poziciji, i veća je od minimalne granice za pomeraj, pomeri kursor miša za sračunatu razliku</a:t>
+            </a:r>
+          </a:p>
+          <a:p>
+            <a:pPr marL="514350" indent="-514350">
+              <a:buFont typeface="+mj-lt"/>
+              <a:buAutoNum type="arabicPeriod" startAt="6"/>
+            </a:pPr>
+            <a:r>
+              <a:rPr lang="sr-Latn-RS" dirty="0" smtClean="0"/>
+              <a:t>Ako postoji razlika u veličini, izvrši pritisak levog ili desnog tastera, u zavisnosti od veličine regiona (region za desni taster je širi od regiona za levi taster)</a:t>
+            </a:r>
+            <a:endParaRPr lang="en-US" dirty="0" smtClean="0"/>
+          </a:p>
+        </p:txBody>
+      </p:sp>
+    </p:spTree>
+    <p:extLst>
+      <p:ext uri="{BB962C8B-B14F-4D97-AF65-F5344CB8AC3E}">
+        <p14:creationId xmlns:p14="http://schemas.microsoft.com/office/powerpoint/2010/main" val="3064637417"/>
+      </p:ext>
+    </p:extLst>
+  </p:cSld>
+  <p:clrMapOvr>
+    <a:masterClrMapping/>
+  </p:clrMapOvr>
+</p:sld>
+</file>
+
+<file path=ppt/slides/slide14.xml><?xml version="1.0" encoding="utf-8"?>
+<p:sld xmlns:a="http://schemas.openxmlformats.org/drawingml/2006/main" xmlns:r="http://schemas.openxmlformats.org/officeDocument/2006/relationships" xmlns:p="http://schemas.openxmlformats.org/presentationml/2006/main">
+  <p:cSld>
+    <p:spTree>
+      <p:nvGrpSpPr>
+        <p:cNvPr id="1" name=""/>
+        <p:cNvGrpSpPr/>
+        <p:nvPr/>
+      </p:nvGrpSpPr>
+      <p:grpSpPr>
+        <a:xfrm>
+          <a:off x="0" y="0"/>
+          <a:ext cx="0" cy="0"/>
+          <a:chOff x="0" y="0"/>
+          <a:chExt cx="0" cy="0"/>
+        </a:xfrm>
+      </p:grpSpPr>
+      <p:sp>
+        <p:nvSpPr>
+          <p:cNvPr id="2" name="Title 1"/>
+          <p:cNvSpPr>
+            <a:spLocks noGrp="1"/>
+          </p:cNvSpPr>
+          <p:nvPr>
+            <p:ph type="title"/>
+          </p:nvPr>
+        </p:nvSpPr>
+        <p:spPr/>
+        <p:txBody>
+          <a:bodyPr>
+            <a:normAutofit fontScale="90000"/>
+          </a:bodyPr>
+          <a:lstStyle/>
+          <a:p>
+            <a:r>
+              <a:rPr lang="sr-Latn-RS" dirty="0" smtClean="0"/>
+              <a:t>Korišćene i alternativne metode/alati/funkcije/opcije/šta god</a:t>
+            </a:r>
+            <a:endParaRPr lang="en-US" dirty="0"/>
+          </a:p>
+        </p:txBody>
+      </p:sp>
+      <p:sp>
+        <p:nvSpPr>
+          <p:cNvPr id="3" name="Content Placeholder 2"/>
+          <p:cNvSpPr>
+            <a:spLocks noGrp="1"/>
+          </p:cNvSpPr>
+          <p:nvPr>
+            <p:ph idx="1"/>
+          </p:nvPr>
+        </p:nvSpPr>
+        <p:spPr/>
+        <p:txBody>
+          <a:bodyPr/>
+          <a:lstStyle/>
+          <a:p>
+            <a:r>
+              <a:rPr lang="en-US" dirty="0" err="1"/>
+              <a:t>popiši</a:t>
+            </a:r>
+            <a:r>
+              <a:rPr lang="en-US" dirty="0"/>
+              <a:t> </a:t>
+            </a:r>
+            <a:r>
+              <a:rPr lang="en-US" dirty="0" err="1"/>
+              <a:t>obavezno</a:t>
+            </a:r>
+            <a:r>
+              <a:rPr lang="en-US" dirty="0"/>
+              <a:t> sve </a:t>
+            </a:r>
+            <a:r>
+              <a:rPr lang="en-US" dirty="0" err="1"/>
+              <a:t>što</a:t>
+            </a:r>
+            <a:r>
+              <a:rPr lang="en-US" dirty="0"/>
+              <a:t> </a:t>
+            </a:r>
+            <a:r>
+              <a:rPr lang="en-US" dirty="0" err="1"/>
+              <a:t>si</a:t>
+            </a:r>
+            <a:r>
+              <a:rPr lang="en-US" dirty="0"/>
+              <a:t> radio, </a:t>
+            </a:r>
+            <a:r>
+              <a:rPr lang="en-US" dirty="0" err="1"/>
+              <a:t>slična</a:t>
+            </a:r>
+            <a:r>
+              <a:rPr lang="en-US" dirty="0"/>
+              <a:t> </a:t>
+            </a:r>
+            <a:r>
+              <a:rPr lang="en-US" dirty="0" err="1"/>
+              <a:t>rešenja</a:t>
+            </a:r>
+            <a:r>
+              <a:rPr lang="en-US" dirty="0"/>
+              <a:t>, reference </a:t>
+            </a:r>
+            <a:r>
+              <a:rPr lang="en-US" dirty="0" err="1"/>
+              <a:t>na</a:t>
+            </a:r>
+            <a:r>
+              <a:rPr lang="en-US" dirty="0"/>
+              <a:t> </a:t>
+            </a:r>
+            <a:r>
+              <a:rPr lang="en-US" dirty="0" err="1"/>
+              <a:t>radove</a:t>
+            </a:r>
+            <a:r>
+              <a:rPr lang="en-US" dirty="0"/>
+              <a:t>, </a:t>
+            </a:r>
+            <a:r>
+              <a:rPr lang="en-US" dirty="0" err="1"/>
+              <a:t>opis</a:t>
+            </a:r>
+            <a:r>
+              <a:rPr lang="en-US" dirty="0"/>
+              <a:t> </a:t>
+            </a:r>
+            <a:r>
+              <a:rPr lang="en-US" dirty="0" err="1"/>
+              <a:t>tehnologij</a:t>
+            </a:r>
+            <a:r>
+              <a:rPr lang="sr-Cyrl-RS" dirty="0"/>
+              <a:t>е/</a:t>
+            </a:r>
+            <a:r>
+              <a:rPr lang="en-US" dirty="0" err="1"/>
+              <a:t>algoritama</a:t>
+            </a:r>
+            <a:r>
+              <a:rPr lang="en-US" dirty="0"/>
+              <a:t> </a:t>
+            </a:r>
+            <a:r>
+              <a:rPr lang="en-US" dirty="0" err="1"/>
+              <a:t>koje</a:t>
+            </a:r>
+            <a:r>
+              <a:rPr lang="en-US" dirty="0"/>
+              <a:t> </a:t>
+            </a:r>
+            <a:r>
+              <a:rPr lang="en-US" dirty="0" err="1"/>
+              <a:t>si</a:t>
+            </a:r>
+            <a:r>
+              <a:rPr lang="en-US" dirty="0"/>
+              <a:t> </a:t>
+            </a:r>
+            <a:r>
+              <a:rPr lang="en-US" dirty="0" err="1"/>
+              <a:t>koristio</a:t>
+            </a:r>
+            <a:r>
+              <a:rPr lang="en-US" dirty="0"/>
+              <a:t>, </a:t>
+            </a:r>
+            <a:r>
+              <a:rPr lang="en-US" dirty="0" err="1"/>
+              <a:t>način</a:t>
+            </a:r>
+            <a:r>
+              <a:rPr lang="en-US" dirty="0"/>
+              <a:t> </a:t>
+            </a:r>
+            <a:r>
+              <a:rPr lang="en-US" dirty="0" err="1"/>
+              <a:t>na</a:t>
+            </a:r>
+            <a:r>
+              <a:rPr lang="en-US" dirty="0"/>
+              <a:t> koji </a:t>
+            </a:r>
+            <a:r>
+              <a:rPr lang="en-US" dirty="0" err="1"/>
+              <a:t>si</a:t>
+            </a:r>
+            <a:r>
+              <a:rPr lang="en-US" dirty="0"/>
+              <a:t> </a:t>
+            </a:r>
+            <a:r>
+              <a:rPr lang="en-US" dirty="0" err="1"/>
+              <a:t>verifikovao</a:t>
+            </a:r>
+            <a:r>
+              <a:rPr lang="en-US" dirty="0"/>
+              <a:t> rad </a:t>
+            </a:r>
+            <a:r>
+              <a:rPr lang="en-US" dirty="0" err="1"/>
+              <a:t>programa</a:t>
+            </a:r>
+            <a:r>
+              <a:rPr lang="en-US" dirty="0"/>
+              <a:t> </a:t>
+            </a:r>
+            <a:r>
+              <a:rPr lang="en-US" dirty="0" err="1"/>
+              <a:t>kao</a:t>
+            </a:r>
+            <a:r>
+              <a:rPr lang="en-US" dirty="0"/>
+              <a:t> i same </a:t>
+            </a:r>
+            <a:r>
+              <a:rPr lang="en-US" dirty="0" err="1"/>
+              <a:t>rezultate</a:t>
+            </a:r>
+            <a:r>
+              <a:rPr lang="en-US" dirty="0"/>
+              <a:t> </a:t>
+            </a:r>
+            <a:r>
+              <a:rPr lang="en-US" dirty="0" err="1"/>
+              <a:t>koje</a:t>
+            </a:r>
+            <a:r>
+              <a:rPr lang="en-US" dirty="0"/>
+              <a:t> </a:t>
+            </a:r>
+            <a:r>
+              <a:rPr lang="en-US" dirty="0" err="1"/>
+              <a:t>si</a:t>
+            </a:r>
+            <a:r>
+              <a:rPr lang="en-US" dirty="0"/>
+              <a:t> </a:t>
+            </a:r>
+            <a:r>
+              <a:rPr lang="en-US" dirty="0" err="1" smtClean="0"/>
+              <a:t>dobio</a:t>
+            </a:r>
+            <a:r>
+              <a:rPr lang="en-US" dirty="0"/>
+              <a:t>. Budi </a:t>
+            </a:r>
+            <a:r>
+              <a:rPr lang="en-US" dirty="0" err="1"/>
+              <a:t>koncizan</a:t>
+            </a:r>
+            <a:r>
+              <a:rPr lang="en-US" dirty="0"/>
+              <a:t> i </a:t>
+            </a:r>
+            <a:r>
+              <a:rPr lang="en-US" dirty="0" err="1"/>
+              <a:t>kratak</a:t>
+            </a:r>
+            <a:r>
+              <a:rPr lang="en-US" dirty="0"/>
+              <a:t> </a:t>
+            </a:r>
+            <a:r>
+              <a:rPr lang="en-US" dirty="0" err="1"/>
+              <a:t>ali</a:t>
+            </a:r>
+            <a:r>
+              <a:rPr lang="en-US" dirty="0"/>
+              <a:t> </a:t>
+            </a:r>
+            <a:r>
+              <a:rPr lang="en-US" dirty="0" err="1"/>
+              <a:t>pokušaj</a:t>
+            </a:r>
+            <a:r>
+              <a:rPr lang="en-US" dirty="0"/>
+              <a:t> da </a:t>
+            </a:r>
+            <a:r>
+              <a:rPr lang="en-US" dirty="0" err="1"/>
+              <a:t>pokriješ</a:t>
+            </a:r>
+            <a:r>
+              <a:rPr lang="en-US" dirty="0"/>
+              <a:t> sve</a:t>
+            </a:r>
+            <a:endParaRPr lang="en-US" dirty="0" smtClean="0"/>
+          </a:p>
+          <a:p>
+            <a:r>
+              <a:rPr lang="en-US" dirty="0" smtClean="0"/>
+              <a:t>SVAKI OD KORAKA IMPLEMENTACIJE KAO POSEBAN NASLOV, I OSTALO STO VEC IMAS</a:t>
+            </a:r>
+            <a:endParaRPr lang="en-US" dirty="0"/>
+          </a:p>
+        </p:txBody>
+      </p:sp>
+    </p:spTree>
+    <p:extLst>
+      <p:ext uri="{BB962C8B-B14F-4D97-AF65-F5344CB8AC3E}">
+        <p14:creationId xmlns:p14="http://schemas.microsoft.com/office/powerpoint/2010/main" val="2853008653"/>
+      </p:ext>
+    </p:extLst>
+  </p:cSld>
+  <p:clrMapOvr>
+    <a:masterClrMapping/>
+  </p:clrMapOvr>
+</p:sld>
+</file>
+
 <file path=ppt/slides/slide2.xml><?xml version="1.0" encoding="utf-8"?>
 <p:sld xmlns:a="http://schemas.openxmlformats.org/drawingml/2006/main" xmlns:r="http://schemas.openxmlformats.org/officeDocument/2006/relationships" xmlns:p="http://schemas.openxmlformats.org/presentationml/2006/main">
   <p:cSld>
@@ -3488,14 +4454,23 @@
         </p:nvSpPr>
         <p:spPr/>
         <p:txBody>
-          <a:bodyPr/>
-          <a:lstStyle/>
-          <a:p>
-            <a:r>
-              <a:rPr lang="en-US" dirty="0" err="1" smtClean="0"/>
-              <a:t>Specifikacija</a:t>
-            </a:r>
-            <a:endParaRPr lang="en-US" dirty="0"/>
+          <a:bodyPr>
+            <a:normAutofit fontScale="90000"/>
+          </a:bodyPr>
+          <a:lstStyle/>
+          <a:p>
+            <a:r>
+              <a:rPr lang="sr-Latn-RS" b="1" dirty="0" smtClean="0"/>
+              <a:t>SPECIFIKACIJA</a:t>
+            </a:r>
+            <a:br>
+              <a:rPr lang="sr-Latn-RS" b="1" dirty="0" smtClean="0"/>
+            </a:br>
+            <a:r>
+              <a:rPr lang="sr-Latn-RS" sz="3100" i="1" dirty="0" smtClean="0"/>
+              <a:t>Šta je potrebno?</a:t>
+            </a:r>
+            <a:endParaRPr lang="en-US" b="1" i="1" dirty="0"/>
           </a:p>
         </p:txBody>
       </p:sp>
@@ -3511,26 +4486,11 @@
         </p:nvSpPr>
         <p:spPr/>
         <p:txBody>
-          <a:bodyPr/>
-          <a:lstStyle/>
-          <a:p>
-            <a:pPr marL="0" indent="0">
-              <a:buNone/>
-            </a:pPr>
-            <a:r>
-              <a:rPr lang="en-US" dirty="0" err="1" smtClean="0"/>
-              <a:t>Potrebno</a:t>
-            </a:r>
-            <a:r>
-              <a:rPr lang="en-US" dirty="0" smtClean="0"/>
-              <a:t>: </a:t>
-            </a:r>
-          </a:p>
-          <a:p>
-            <a:r>
-              <a:rPr lang="en-US" dirty="0" smtClean="0"/>
-              <a:t>	</a:t>
-            </a:r>
+          <a:bodyPr>
+            <a:normAutofit/>
+          </a:bodyPr>
+          <a:lstStyle/>
+          <a:p>
             <a:r>
               <a:rPr lang="en-US" dirty="0" err="1" smtClean="0"/>
               <a:t>Jedna</a:t>
@@ -3550,10 +4510,6 @@
           </a:p>
           <a:p>
             <a:r>
-              <a:rPr lang="en-US" dirty="0" smtClean="0"/>
-              <a:t>	</a:t>
-            </a:r>
-            <a:r>
               <a:rPr lang="en-US" dirty="0" err="1" smtClean="0"/>
               <a:t>Kompjuter</a:t>
             </a:r>
@@ -3565,7 +4521,7 @@
           <a:p>
             <a:r>
               <a:rPr lang="en-US" dirty="0" smtClean="0"/>
-              <a:t>	Web </a:t>
+              <a:t>Web </a:t>
             </a:r>
             <a:r>
               <a:rPr lang="en-US" dirty="0" err="1" smtClean="0"/>
@@ -3574,12 +4530,49 @@
             <a:endParaRPr lang="sr-Latn-RS" dirty="0" smtClean="0"/>
           </a:p>
           <a:p>
-            <a:pPr marL="0" indent="0">
-              <a:buNone/>
-            </a:pPr>
             <a:r>
               <a:rPr lang="sr-Latn-RS" dirty="0" smtClean="0"/>
-              <a:t>Rešenje će biti implementirano u programskom jeziku Python, uz korišćenje biblioteke OpenCV2.</a:t>
+              <a:t>Python</a:t>
+            </a:r>
+          </a:p>
+          <a:p>
+            <a:r>
+              <a:rPr lang="sr-Latn-RS" dirty="0" smtClean="0"/>
+              <a:t>Biblioteke:</a:t>
+            </a:r>
+          </a:p>
+          <a:p>
+            <a:pPr lvl="1"/>
+            <a:r>
+              <a:rPr lang="sr-Latn-RS" dirty="0" smtClean="0"/>
+              <a:t>OpenCV2 </a:t>
+            </a:r>
+            <a:r>
+              <a:rPr lang="sr-Latn-RS" sz="2400" dirty="0" smtClean="0"/>
+              <a:t>– obrada slike</a:t>
+            </a:r>
+            <a:endParaRPr lang="sr-Latn-RS" dirty="0" smtClean="0"/>
+          </a:p>
+          <a:p>
+            <a:pPr lvl="1"/>
+            <a:r>
+              <a:rPr lang="sr-Latn-RS" dirty="0" smtClean="0"/>
+              <a:t>Keras </a:t>
+            </a:r>
+            <a:r>
+              <a:rPr lang="sr-Latn-RS" sz="2400" dirty="0" smtClean="0"/>
+              <a:t>– veštačke neuronske mreže</a:t>
+            </a:r>
+          </a:p>
+          <a:p>
+            <a:pPr lvl="1"/>
+            <a:r>
+              <a:rPr lang="sr-Latn-RS" dirty="0" smtClean="0"/>
+              <a:t>PyAutoGui </a:t>
+            </a:r>
+            <a:r>
+              <a:rPr lang="sr-Latn-RS" sz="2400" dirty="0" smtClean="0"/>
+              <a:t>– upravljanje računarom</a:t>
             </a:r>
             <a:endParaRPr lang="en-US" dirty="0" smtClean="0"/>
           </a:p>
@@ -3627,14 +4620,43 @@
         </p:nvSpPr>
         <p:spPr/>
         <p:txBody>
-          <a:bodyPr/>
-          <a:lstStyle/>
-          <a:p>
-            <a:r>
-              <a:rPr lang="en-US" dirty="0" err="1" smtClean="0"/>
-              <a:t>Specifikacija</a:t>
-            </a:r>
-            <a:endParaRPr lang="en-US" dirty="0"/>
+          <a:bodyPr>
+            <a:normAutofit fontScale="90000"/>
+          </a:bodyPr>
+          <a:lstStyle/>
+          <a:p>
+            <a:r>
+              <a:rPr lang="en-US" b="1" dirty="0" smtClean="0"/>
+              <a:t>SPECIFIKACIJA</a:t>
+            </a:r>
+            <a:r>
+              <a:rPr lang="en-US" dirty="0" smtClean="0"/>
+              <a:t/>
+            </a:r>
+            <a:br>
+              <a:rPr lang="en-US" dirty="0" smtClean="0"/>
+            </a:br>
+            <a:r>
+              <a:rPr lang="en-US" sz="3100" i="1" dirty="0" err="1" smtClean="0"/>
+              <a:t>Kako</a:t>
+            </a:r>
+            <a:r>
+              <a:rPr lang="sr-Latn-RS" sz="3100" i="1" dirty="0" smtClean="0"/>
+              <a:t> program</a:t>
+            </a:r>
+            <a:r>
+              <a:rPr lang="en-US" sz="3100" i="1" dirty="0" smtClean="0"/>
+              <a:t> </a:t>
+            </a:r>
+            <a:r>
+              <a:rPr lang="en-US" sz="3100" i="1" dirty="0" err="1" smtClean="0"/>
+              <a:t>funkcioni</a:t>
+            </a:r>
+            <a:r>
+              <a:rPr lang="sr-Latn-RS" sz="3100" i="1" dirty="0" smtClean="0"/>
+              <a:t>še?</a:t>
+            </a:r>
+            <a:endParaRPr lang="en-US" sz="3100" i="1" dirty="0"/>
           </a:p>
         </p:txBody>
       </p:sp>
@@ -3651,47 +4673,381 @@
         <p:spPr/>
         <p:txBody>
           <a:bodyPr>
-            <a:normAutofit fontScale="92500" lnSpcReduction="20000"/>
+            <a:normAutofit lnSpcReduction="10000"/>
           </a:bodyPr>
           <a:lstStyle/>
           <a:p>
-            <a:pPr marL="0" indent="0">
-              <a:buNone/>
+            <a:pPr marL="514350" indent="-514350">
+              <a:spcBef>
+                <a:spcPts val="0"/>
+              </a:spcBef>
+              <a:buFont typeface="+mj-lt"/>
+              <a:buAutoNum type="arabicPeriod"/>
             </a:pPr>
             <a:r>
-              <a:rPr lang="en-US" dirty="0" err="1" smtClean="0"/>
-              <a:t>Kako</a:t>
-            </a:r>
-            <a:r>
-              <a:rPr lang="en-US" dirty="0" smtClean="0"/>
+              <a:rPr lang="sr-Latn-RS" sz="2800" dirty="0" smtClean="0"/>
+              <a:t>Obučimo neuronsku mrežu</a:t>
+            </a:r>
+          </a:p>
+          <a:p>
+            <a:pPr>
+              <a:spcBef>
+                <a:spcPts val="0"/>
+              </a:spcBef>
+            </a:pPr>
+            <a:r>
+              <a:rPr lang="sr-Latn-RS" sz="2000" dirty="0" smtClean="0"/>
+              <a:t>Učitamo sliku koja predstavlja obučavajući skup</a:t>
+            </a:r>
+          </a:p>
+          <a:p>
+            <a:pPr lvl="1">
+              <a:spcBef>
+                <a:spcPts val="0"/>
+              </a:spcBef>
+            </a:pPr>
+            <a:r>
+              <a:rPr lang="en-US" sz="1600" i="1" dirty="0" err="1"/>
+              <a:t>img_train</a:t>
+            </a:r>
+            <a:r>
+              <a:rPr lang="en-US" sz="1600" i="1" dirty="0"/>
+              <a:t> = </a:t>
+            </a:r>
+            <a:r>
+              <a:rPr lang="en-US" sz="1600" i="1" dirty="0" err="1"/>
+              <a:t>simF.load_image</a:t>
+            </a:r>
+            <a:r>
+              <a:rPr lang="en-US" sz="1600" i="1" dirty="0"/>
+              <a:t>('fist_state.png')</a:t>
+            </a:r>
+            <a:endParaRPr lang="sr-Latn-RS" sz="1600" i="1" dirty="0" smtClean="0"/>
+          </a:p>
+          <a:p>
+            <a:pPr>
+              <a:spcBef>
+                <a:spcPts val="0"/>
+              </a:spcBef>
+            </a:pPr>
+            <a:r>
+              <a:rPr lang="sr-Latn-RS" sz="2000" dirty="0" smtClean="0"/>
+              <a:t>Konvertujemo je u grayscale, pa u binarni oblik</a:t>
+            </a:r>
+            <a:endParaRPr lang="en-US" sz="2000" dirty="0" smtClean="0"/>
+          </a:p>
+          <a:p>
+            <a:pPr lvl="1">
+              <a:spcBef>
+                <a:spcPts val="0"/>
+              </a:spcBef>
+            </a:pPr>
+            <a:r>
+              <a:rPr lang="en-US" sz="1600" i="1" dirty="0" err="1"/>
+              <a:t>img_train_bin</a:t>
+            </a:r>
+            <a:r>
+              <a:rPr lang="en-US" sz="1600" i="1" dirty="0"/>
+              <a:t> = </a:t>
+            </a:r>
+            <a:r>
+              <a:rPr lang="en-US" sz="1600" i="1" dirty="0" err="1"/>
+              <a:t>simF.get_image_bin</a:t>
+            </a:r>
+            <a:r>
+              <a:rPr lang="en-US" sz="1600" i="1" dirty="0"/>
+              <a:t>(</a:t>
+            </a:r>
+            <a:r>
+              <a:rPr lang="en-US" sz="1600" i="1" dirty="0" err="1"/>
+              <a:t>simF.get_image_gray</a:t>
+            </a:r>
+            <a:r>
+              <a:rPr lang="en-US" sz="1600" i="1" dirty="0"/>
+              <a:t>(</a:t>
+            </a:r>
+            <a:r>
+              <a:rPr lang="en-US" sz="1600" i="1" dirty="0" err="1"/>
+              <a:t>img_train</a:t>
+            </a:r>
+            <a:r>
+              <a:rPr lang="en-US" sz="1600" i="1" dirty="0"/>
+              <a:t>))</a:t>
+            </a:r>
+            <a:endParaRPr lang="sr-Latn-RS" sz="1600" i="1" dirty="0" smtClean="0"/>
+          </a:p>
+          <a:p>
+            <a:pPr>
+              <a:spcBef>
+                <a:spcPts val="0"/>
+              </a:spcBef>
+            </a:pPr>
+            <a:r>
+              <a:rPr lang="sr-Latn-RS" sz="2000" dirty="0" smtClean="0"/>
+              <a:t>Odredimo regione od interesa na binarnoj slici</a:t>
+            </a:r>
+            <a:endParaRPr lang="en-US" sz="2000" dirty="0" smtClean="0"/>
+          </a:p>
+          <a:p>
+            <a:pPr lvl="1">
+              <a:spcBef>
+                <a:spcPts val="0"/>
+              </a:spcBef>
+            </a:pPr>
+            <a:r>
+              <a:rPr lang="en-US" sz="1600" i="1" dirty="0" err="1"/>
+              <a:t>sel_img_train</a:t>
+            </a:r>
+            <a:r>
+              <a:rPr lang="en-US" sz="1600" i="1" dirty="0"/>
+              <a:t>, shapes, rectangles, dots = </a:t>
+            </a:r>
+            <a:r>
+              <a:rPr lang="en-US" sz="1600" i="1" dirty="0" err="1"/>
+              <a:t>regF.select_roi</a:t>
+            </a:r>
+            <a:r>
+              <a:rPr lang="en-US" sz="1600" i="1" dirty="0"/>
+              <a:t>(</a:t>
+            </a:r>
+            <a:r>
+              <a:rPr lang="en-US" sz="1600" i="1" dirty="0" err="1"/>
+              <a:t>img_train.copy</a:t>
+            </a:r>
+            <a:r>
+              <a:rPr lang="en-US" sz="1600" i="1" dirty="0"/>
+              <a:t>(), </a:t>
+            </a:r>
+            <a:r>
+              <a:rPr lang="en-US" sz="1600" i="1" dirty="0" err="1"/>
+              <a:t>img_train_bin</a:t>
+            </a:r>
+            <a:r>
+              <a:rPr lang="en-US" sz="1600" i="1" dirty="0"/>
+              <a:t>)</a:t>
+            </a:r>
+            <a:endParaRPr lang="sr-Latn-RS" sz="1600" i="1" dirty="0" smtClean="0"/>
+          </a:p>
+          <a:p>
+            <a:pPr>
+              <a:spcBef>
+                <a:spcPts val="0"/>
+              </a:spcBef>
+            </a:pPr>
+            <a:r>
+              <a:rPr lang="sr-Latn-RS" sz="2000" dirty="0" smtClean="0"/>
+              <a:t>Regione „formatiramo“ tako da ih veštačka neuronska mreža može očitati</a:t>
+            </a:r>
+            <a:endParaRPr lang="en-US" sz="2000" dirty="0" smtClean="0"/>
+          </a:p>
+          <a:p>
+            <a:pPr lvl="1">
+              <a:spcBef>
+                <a:spcPts val="0"/>
+              </a:spcBef>
+            </a:pPr>
+            <a:r>
+              <a:rPr lang="en-US" sz="1600" i="1" dirty="0"/>
+              <a:t>inputs = </a:t>
+            </a:r>
+            <a:r>
+              <a:rPr lang="en-US" sz="1600" i="1" dirty="0" err="1"/>
+              <a:t>simF.prepare_for_ann</a:t>
+            </a:r>
+            <a:r>
+              <a:rPr lang="en-US" sz="1600" i="1" dirty="0"/>
+              <a:t>(shapes)</a:t>
+            </a:r>
+            <a:endParaRPr lang="sr-Latn-RS" sz="1600" i="1" dirty="0" smtClean="0"/>
+          </a:p>
+          <a:p>
+            <a:pPr>
+              <a:spcBef>
+                <a:spcPts val="0"/>
+              </a:spcBef>
+            </a:pPr>
+            <a:r>
+              <a:rPr lang="sr-Latn-RS" sz="2000" dirty="0" smtClean="0"/>
+              <a:t>Napravimo skup izlaznih vrednosti,</a:t>
+            </a:r>
+            <a:r>
+              <a:rPr lang="en-US" sz="2000" dirty="0" smtClean="0"/>
               <a:t> </a:t>
             </a:r>
             <a:r>
-              <a:rPr lang="en-US" dirty="0" err="1" smtClean="0"/>
-              <a:t>funkcioni</a:t>
-            </a:r>
-            <a:r>
-              <a:rPr lang="sr-Latn-RS" dirty="0" smtClean="0"/>
-              <a:t>še:</a:t>
-            </a:r>
-          </a:p>
-          <a:p>
-            <a:r>
-              <a:rPr lang="sr-Latn-RS" dirty="0" smtClean="0"/>
-              <a:t>Kamera sve vreme snima šta se događa u njenom vidnom polju</a:t>
-            </a:r>
-          </a:p>
-          <a:p>
-            <a:r>
-              <a:rPr lang="sr-Latn-RS" dirty="0" smtClean="0"/>
-              <a:t>Snimak se u pozadini softverski obrađuje, sa ciljem da se u frejmovima pronađe oblik koji predstavlja raširenu ljudsku šaku, ili da bar liči na nju</a:t>
-            </a:r>
-          </a:p>
-          <a:p>
-            <a:r>
-              <a:rPr lang="sr-Latn-RS" dirty="0" smtClean="0"/>
-              <a:t>Ako se šaka pojavi na snimku, softver šračunava region koji šaka zauzima na svakom frejmu snimka, i na osnovu regiona proverava da li se ona kreće ili vrši neki gest</a:t>
-            </a:r>
+              <a:rPr lang="en-US" sz="2000" dirty="0" err="1" smtClean="0"/>
+              <a:t>prevedemo</a:t>
+            </a:r>
+            <a:r>
+              <a:rPr lang="en-US" sz="2000" dirty="0" smtClean="0"/>
+              <a:t> </a:t>
+            </a:r>
+            <a:r>
+              <a:rPr lang="en-US" sz="2000" dirty="0" err="1" smtClean="0"/>
+              <a:t>ga</a:t>
+            </a:r>
+            <a:r>
+              <a:rPr lang="en-US" sz="2000" dirty="0" smtClean="0"/>
+              <a:t> u </a:t>
+            </a:r>
+            <a:r>
+              <a:rPr lang="en-US" sz="2000" dirty="0" err="1" smtClean="0"/>
+              <a:t>oblik</a:t>
+            </a:r>
+            <a:r>
+              <a:rPr lang="en-US" sz="2000" dirty="0" smtClean="0"/>
+              <a:t> </a:t>
+            </a:r>
+            <a:r>
+              <a:rPr lang="en-US" sz="2000" dirty="0" err="1" smtClean="0"/>
+              <a:t>pogodan</a:t>
+            </a:r>
+            <a:r>
+              <a:rPr lang="en-US" sz="2000" dirty="0" smtClean="0"/>
+              <a:t> za </a:t>
+            </a:r>
+            <a:r>
+              <a:rPr lang="sr-Latn-RS" sz="2000" dirty="0" smtClean="0"/>
+              <a:t>V</a:t>
+            </a:r>
+            <a:r>
+              <a:rPr lang="en-US" sz="2000" dirty="0" smtClean="0"/>
+              <a:t>NM</a:t>
+            </a:r>
+          </a:p>
+          <a:p>
+            <a:pPr lvl="1">
+              <a:spcBef>
+                <a:spcPts val="0"/>
+              </a:spcBef>
+            </a:pPr>
+            <a:r>
+              <a:rPr lang="en-US" sz="1600" i="1" dirty="0" err="1"/>
+              <a:t>hand_state</a:t>
+            </a:r>
+            <a:r>
+              <a:rPr lang="en-US" sz="1600" i="1" dirty="0"/>
+              <a:t> = </a:t>
+            </a:r>
+            <a:r>
+              <a:rPr lang="en-US" sz="1600" i="1" dirty="0" smtClean="0"/>
+              <a:t>[…]</a:t>
+            </a:r>
+          </a:p>
+          <a:p>
+            <a:pPr lvl="1">
+              <a:spcBef>
+                <a:spcPts val="0"/>
+              </a:spcBef>
+            </a:pPr>
+            <a:r>
+              <a:rPr lang="en-US" sz="1600" i="1" dirty="0"/>
+              <a:t>outputs = </a:t>
+            </a:r>
+            <a:r>
+              <a:rPr lang="en-US" sz="1600" i="1" dirty="0" err="1"/>
+              <a:t>simF.convert_output</a:t>
+            </a:r>
+            <a:r>
+              <a:rPr lang="en-US" sz="1600" i="1" dirty="0"/>
+              <a:t>(</a:t>
+            </a:r>
+            <a:r>
+              <a:rPr lang="en-US" sz="1600" i="1" dirty="0" err="1"/>
+              <a:t>hand_state</a:t>
+            </a:r>
+            <a:r>
+              <a:rPr lang="en-US" sz="1600" i="1" dirty="0"/>
+              <a:t>)</a:t>
+            </a:r>
+            <a:endParaRPr lang="en-US" sz="1600" i="1" dirty="0" smtClean="0"/>
+          </a:p>
+          <a:p>
+            <a:pPr>
+              <a:spcBef>
+                <a:spcPts val="0"/>
+              </a:spcBef>
+            </a:pPr>
+            <a:r>
+              <a:rPr lang="en-US" sz="2000" dirty="0" err="1" smtClean="0"/>
+              <a:t>Napravimo</a:t>
+            </a:r>
+            <a:r>
+              <a:rPr lang="en-US" sz="2000" dirty="0" smtClean="0"/>
+              <a:t> i </a:t>
+            </a:r>
+            <a:r>
+              <a:rPr lang="en-US" sz="2000" dirty="0" err="1" smtClean="0"/>
+              <a:t>treniramo</a:t>
+            </a:r>
+            <a:r>
+              <a:rPr lang="en-US" sz="2000" dirty="0" smtClean="0"/>
+              <a:t> </a:t>
+            </a:r>
+            <a:r>
+              <a:rPr lang="en-US" sz="2000" dirty="0" err="1" smtClean="0"/>
+              <a:t>ve</a:t>
+            </a:r>
+            <a:r>
+              <a:rPr lang="sr-Latn-RS" sz="2000" dirty="0" smtClean="0"/>
+              <a:t>štačku NM</a:t>
+            </a:r>
+            <a:endParaRPr lang="en-US" sz="2000" dirty="0" smtClean="0"/>
+          </a:p>
+          <a:p>
+            <a:pPr lvl="1">
+              <a:spcBef>
+                <a:spcPts val="0"/>
+              </a:spcBef>
+            </a:pPr>
+            <a:r>
+              <a:rPr lang="en-US" sz="1600" i="1" dirty="0" err="1"/>
+              <a:t>ann</a:t>
+            </a:r>
+            <a:r>
+              <a:rPr lang="en-US" sz="1600" i="1" dirty="0"/>
+              <a:t> = </a:t>
+            </a:r>
+            <a:r>
+              <a:rPr lang="en-US" sz="1600" i="1" dirty="0" err="1"/>
+              <a:t>annFs.create_ann</a:t>
+            </a:r>
+            <a:r>
+              <a:rPr lang="en-US" sz="1600" i="1" dirty="0" smtClean="0"/>
+              <a:t>()</a:t>
+            </a:r>
+          </a:p>
+          <a:p>
+            <a:pPr lvl="1">
+              <a:spcBef>
+                <a:spcPts val="0"/>
+              </a:spcBef>
+            </a:pPr>
+            <a:r>
+              <a:rPr lang="en-US" sz="1600" i="1" dirty="0" err="1"/>
+              <a:t>ann</a:t>
+            </a:r>
+            <a:r>
+              <a:rPr lang="en-US" sz="1600" i="1" dirty="0"/>
+              <a:t> = </a:t>
+            </a:r>
+            <a:r>
+              <a:rPr lang="en-US" sz="1600" i="1" dirty="0" err="1"/>
+              <a:t>annFs.train_ann</a:t>
+            </a:r>
+            <a:r>
+              <a:rPr lang="en-US" sz="1600" i="1" dirty="0"/>
+              <a:t>(</a:t>
+            </a:r>
+            <a:r>
+              <a:rPr lang="en-US" sz="1600" i="1" dirty="0" err="1"/>
+              <a:t>ann</a:t>
+            </a:r>
+            <a:r>
+              <a:rPr lang="en-US" sz="1600" i="1" dirty="0"/>
+              <a:t>, inputs, outputs)  # MOZDA NEKI TEST DATA SET</a:t>
+            </a:r>
+            <a:endParaRPr lang="en-US" sz="1600" i="1" dirty="0" smtClean="0"/>
           </a:p>
         </p:txBody>
       </p:sp>
@@ -3705,6 +5061,13 @@
   <p:clrMapOvr>
     <a:masterClrMapping/>
   </p:clrMapOvr>
+  <p:timing>
+    <p:tnLst>
+      <p:par>
+        <p:cTn id="1" dur="indefinite" restart="never" nodeType="tmRoot"/>
+      </p:par>
+    </p:tnLst>
+  </p:timing>
 </p:sld>
 </file>
 
@@ -3727,7 +5090,7 @@
       </p:grpSpPr>
       <p:sp>
         <p:nvSpPr>
-          <p:cNvPr id="5" name="Title 4"/>
+          <p:cNvPr id="4" name="Title 3"/>
           <p:cNvSpPr>
             <a:spLocks noGrp="1"/>
           </p:cNvSpPr>
@@ -3737,20 +5100,49 @@
         </p:nvSpPr>
         <p:spPr/>
         <p:txBody>
-          <a:bodyPr/>
-          <a:lstStyle/>
-          <a:p>
-            <a:r>
-              <a:rPr lang="sr-Latn-RS" dirty="0" smtClean="0"/>
-              <a:t>Specifikacija</a:t>
-            </a:r>
-            <a:endParaRPr lang="en-US" dirty="0"/>
-          </a:p>
-        </p:txBody>
-      </p:sp>
-      <p:sp>
-        <p:nvSpPr>
-          <p:cNvPr id="6" name="Content Placeholder 5"/>
+          <a:bodyPr>
+            <a:normAutofit fontScale="90000"/>
+          </a:bodyPr>
+          <a:lstStyle/>
+          <a:p>
+            <a:r>
+              <a:rPr lang="en-US" b="1" dirty="0" smtClean="0"/>
+              <a:t>SPECIFIKACIJA</a:t>
+            </a:r>
+            <a:r>
+              <a:rPr lang="en-US" dirty="0" smtClean="0"/>
+              <a:t/>
+            </a:r>
+            <a:br>
+              <a:rPr lang="en-US" dirty="0" smtClean="0"/>
+            </a:br>
+            <a:r>
+              <a:rPr lang="en-US" sz="3100" i="1" dirty="0" err="1" smtClean="0"/>
+              <a:t>Kako</a:t>
+            </a:r>
+            <a:r>
+              <a:rPr lang="sr-Latn-RS" sz="3100" i="1" dirty="0" smtClean="0"/>
+              <a:t> program</a:t>
+            </a:r>
+            <a:r>
+              <a:rPr lang="en-US" sz="3100" i="1" dirty="0" smtClean="0"/>
+              <a:t> </a:t>
+            </a:r>
+            <a:r>
+              <a:rPr lang="en-US" sz="3100" i="1" dirty="0" err="1" smtClean="0"/>
+              <a:t>funkcioni</a:t>
+            </a:r>
+            <a:r>
+              <a:rPr lang="sr-Latn-RS" sz="3100" i="1" dirty="0" smtClean="0"/>
+              <a:t>še?</a:t>
+            </a:r>
+            <a:endParaRPr lang="en-US" sz="3100" i="1" dirty="0"/>
+          </a:p>
+        </p:txBody>
+      </p:sp>
+      <p:sp>
+        <p:nvSpPr>
+          <p:cNvPr id="5" name="Content Placeholder 4"/>
           <p:cNvSpPr>
             <a:spLocks noGrp="1"/>
           </p:cNvSpPr>
@@ -3761,46 +5153,213 @@
         <p:spPr/>
         <p:txBody>
           <a:bodyPr>
-            <a:noAutofit/>
+            <a:normAutofit/>
           </a:bodyPr>
           <a:lstStyle/>
           <a:p>
-            <a:r>
-              <a:rPr lang="sr-Latn-RS" sz="2500" dirty="0" smtClean="0"/>
-              <a:t>Ako se čitava šaka kreće, sračunava se razlika u pomeraju i na osnovu vrednosti te razlike pomeramo kursor miša</a:t>
-            </a:r>
-          </a:p>
-          <a:p>
-            <a:r>
-              <a:rPr lang="sr-Latn-RS" sz="2500" dirty="0" smtClean="0"/>
-              <a:t>Ako šaka vrši neki gest (skupljena šaka/neki od prstiju šake...), proverava se veličina regiona šake, i ako je region određenih dimenzija, vrši se programski pritisak levog (skupljeni svi prsti) ili desnog (palac nije skupljen) tastera miša</a:t>
-            </a:r>
-          </a:p>
-          <a:p>
-            <a:r>
-              <a:rPr lang="sr-Latn-RS" sz="2500" dirty="0" smtClean="0"/>
-              <a:t>Dok je šaka u gestu, softver će takođe pratiti njen pomeraj i nastaviti da pomera kursor na osnovu pomeraja šake</a:t>
-            </a:r>
-          </a:p>
-          <a:p>
-            <a:r>
-              <a:rPr lang="sr-Latn-RS" sz="2500" dirty="0" smtClean="0"/>
-              <a:t>Kada se šaka vrati u prvobitno stanje (rašireni prsti) pritisnut taster se programski pušta</a:t>
-            </a:r>
-            <a:endParaRPr lang="en-US" sz="2500" dirty="0"/>
+            <a:pPr marL="514350" indent="-514350">
+              <a:spcBef>
+                <a:spcPts val="0"/>
+              </a:spcBef>
+              <a:buFont typeface="+mj-lt"/>
+              <a:buAutoNum type="arabicPeriod" startAt="2"/>
+            </a:pPr>
+            <a:r>
+              <a:rPr lang="sr-Latn-RS" sz="2800" dirty="0" smtClean="0"/>
+              <a:t>Kamera sve vreme snima šta se događa u njenom vidnom polju</a:t>
+            </a:r>
+            <a:endParaRPr lang="sr-Latn-RS" dirty="0" smtClean="0"/>
+          </a:p>
+          <a:p>
+            <a:pPr>
+              <a:spcBef>
+                <a:spcPts val="0"/>
+              </a:spcBef>
+            </a:pPr>
+            <a:r>
+              <a:rPr lang="sr-Latn-RS" sz="2000" dirty="0" smtClean="0"/>
+              <a:t>Napravi </a:t>
+            </a:r>
+            <a:r>
+              <a:rPr lang="sr-Latn-RS" sz="2000" i="1" dirty="0" smtClean="0"/>
+              <a:t>VideoCapture</a:t>
+            </a:r>
+            <a:r>
+              <a:rPr lang="sr-Latn-RS" sz="2000" dirty="0" smtClean="0"/>
+              <a:t> objekat</a:t>
+            </a:r>
+          </a:p>
+          <a:p>
+            <a:pPr lvl="1">
+              <a:spcBef>
+                <a:spcPts val="0"/>
+              </a:spcBef>
+            </a:pPr>
+            <a:r>
+              <a:rPr lang="en-US" sz="1600" i="1" dirty="0" err="1" smtClean="0"/>
+              <a:t>video_capture</a:t>
+            </a:r>
+            <a:r>
+              <a:rPr lang="en-US" sz="1600" dirty="0" smtClean="0"/>
+              <a:t> </a:t>
+            </a:r>
+            <a:r>
+              <a:rPr lang="en-US" sz="1600" i="1" dirty="0" smtClean="0"/>
+              <a:t>=</a:t>
+            </a:r>
+            <a:r>
+              <a:rPr lang="en-US" sz="1600" dirty="0" smtClean="0"/>
+              <a:t> </a:t>
+            </a:r>
+            <a:r>
+              <a:rPr lang="en-US" sz="1600" i="1" dirty="0"/>
+              <a:t>cv2.VideoCapture</a:t>
+            </a:r>
+            <a:r>
+              <a:rPr lang="en-US" sz="1600" i="1" dirty="0" smtClean="0"/>
+              <a:t>()</a:t>
+            </a:r>
+            <a:endParaRPr lang="sr-Latn-RS" sz="1600" i="1" dirty="0" smtClean="0"/>
+          </a:p>
+          <a:p>
+            <a:pPr>
+              <a:spcBef>
+                <a:spcPts val="0"/>
+              </a:spcBef>
+            </a:pPr>
+            <a:endParaRPr lang="sr-Latn-RS" sz="2000" dirty="0" smtClean="0"/>
+          </a:p>
+          <a:p>
+            <a:pPr>
+              <a:spcBef>
+                <a:spcPts val="0"/>
+              </a:spcBef>
+            </a:pPr>
+            <a:r>
+              <a:rPr lang="sr-Latn-RS" sz="2000" dirty="0" smtClean="0"/>
+              <a:t>Poveži se sa kamerom i uključi je</a:t>
+            </a:r>
+          </a:p>
+          <a:p>
+            <a:pPr lvl="1">
+              <a:spcBef>
+                <a:spcPts val="0"/>
+              </a:spcBef>
+            </a:pPr>
+            <a:r>
+              <a:rPr lang="en-US" sz="1600" i="1" dirty="0" err="1" smtClean="0"/>
+              <a:t>video_capture.open</a:t>
+            </a:r>
+            <a:r>
+              <a:rPr lang="en-US" sz="1600" i="1" dirty="0" smtClean="0"/>
+              <a:t>(0)</a:t>
+            </a:r>
+            <a:endParaRPr lang="sr-Latn-RS" sz="1600" i="1" dirty="0" smtClean="0"/>
+          </a:p>
+          <a:p>
+            <a:pPr>
+              <a:spcBef>
+                <a:spcPts val="0"/>
+              </a:spcBef>
+            </a:pPr>
+            <a:endParaRPr lang="sr-Latn-RS" sz="2000" dirty="0" smtClean="0"/>
+          </a:p>
+          <a:p>
+            <a:pPr>
+              <a:spcBef>
+                <a:spcPts val="0"/>
+              </a:spcBef>
+            </a:pPr>
+            <a:r>
+              <a:rPr lang="sr-Latn-RS" sz="2000" dirty="0" smtClean="0"/>
+              <a:t>Uzimaj frejmove koje kamera snimi sve dok je kamera uključena</a:t>
+            </a:r>
+          </a:p>
+          <a:p>
+            <a:pPr lvl="1">
+              <a:spcBef>
+                <a:spcPts val="0"/>
+              </a:spcBef>
+            </a:pPr>
+            <a:r>
+              <a:rPr lang="en-US" sz="1600" b="1" i="1" dirty="0" smtClean="0"/>
+              <a:t>while </a:t>
+            </a:r>
+            <a:r>
+              <a:rPr lang="en-US" sz="1600" i="1" dirty="0" err="1"/>
+              <a:t>video_capture</a:t>
+            </a:r>
+            <a:r>
+              <a:rPr lang="en-US" sz="1600" i="1" dirty="0" err="1" smtClean="0"/>
+              <a:t>.isOpened</a:t>
+            </a:r>
+            <a:r>
+              <a:rPr lang="en-US" sz="1600" i="1" dirty="0" smtClean="0"/>
+              <a:t>():</a:t>
+            </a:r>
+            <a:endParaRPr lang="sr-Latn-RS" sz="1600" i="1" dirty="0" smtClean="0"/>
+          </a:p>
+          <a:p>
+            <a:pPr marL="400050" lvl="1" indent="0">
+              <a:buNone/>
+            </a:pPr>
+            <a:r>
+              <a:rPr lang="en-US" sz="2000" i="1" dirty="0"/>
+              <a:t>	</a:t>
+            </a:r>
+            <a:r>
+              <a:rPr lang="sr-Latn-RS" sz="2000" i="1" dirty="0" smtClean="0"/>
+              <a:t>      </a:t>
+            </a:r>
+            <a:r>
+              <a:rPr lang="en-US" sz="1600" i="1" dirty="0" smtClean="0"/>
+              <a:t>ret</a:t>
+            </a:r>
+            <a:r>
+              <a:rPr lang="en-US" sz="1600" i="1" dirty="0"/>
+              <a:t>, </a:t>
+            </a:r>
+            <a:r>
+              <a:rPr lang="en-US" sz="1600" i="1" dirty="0" err="1"/>
+              <a:t>img</a:t>
+            </a:r>
+            <a:r>
+              <a:rPr lang="en-US" sz="1600" i="1" dirty="0"/>
+              <a:t> = </a:t>
+            </a:r>
+            <a:r>
+              <a:rPr lang="en-US" sz="1600" i="1" dirty="0" err="1"/>
+              <a:t>video_capture</a:t>
+            </a:r>
+            <a:r>
+              <a:rPr lang="en-US" sz="1600" i="1" dirty="0" err="1" smtClean="0"/>
+              <a:t>.read</a:t>
+            </a:r>
+            <a:r>
+              <a:rPr lang="en-US" sz="1600" i="1" dirty="0" smtClean="0"/>
+              <a:t>()</a:t>
+            </a:r>
+            <a:endParaRPr lang="sr-Latn-RS" sz="1800" i="1" dirty="0" smtClean="0"/>
           </a:p>
         </p:txBody>
       </p:sp>
     </p:spTree>
     <p:extLst>
       <p:ext uri="{BB962C8B-B14F-4D97-AF65-F5344CB8AC3E}">
-        <p14:creationId xmlns:p14="http://schemas.microsoft.com/office/powerpoint/2010/main" val="3741210957"/>
+        <p14:creationId xmlns:p14="http://schemas.microsoft.com/office/powerpoint/2010/main" val="1580887538"/>
       </p:ext>
     </p:extLst>
   </p:cSld>
   <p:clrMapOvr>
     <a:masterClrMapping/>
   </p:clrMapOvr>
+  <p:timing>
+    <p:tnLst>
+      <p:par>
+        <p:cTn id="1" dur="indefinite" restart="never" nodeType="tmRoot"/>
+      </p:par>
+    </p:tnLst>
+  </p:timing>
 </p:sld>
 </file>
 
@@ -3823,7 +5382,7 @@
       </p:grpSpPr>
       <p:sp>
         <p:nvSpPr>
-          <p:cNvPr id="5" name="Title 4"/>
+          <p:cNvPr id="2" name="Title 1"/>
           <p:cNvSpPr>
             <a:spLocks noGrp="1"/>
           </p:cNvSpPr>
@@ -3833,73 +5392,413 @@
         </p:nvSpPr>
         <p:spPr/>
         <p:txBody>
-          <a:bodyPr/>
-          <a:lstStyle/>
-          <a:p>
-            <a:r>
-              <a:rPr lang="sr-Latn-RS" dirty="0" smtClean="0"/>
-              <a:t>Specifikacija</a:t>
+          <a:bodyPr>
+            <a:normAutofit fontScale="90000"/>
+          </a:bodyPr>
+          <a:lstStyle/>
+          <a:p>
+            <a:r>
+              <a:rPr lang="en-US" b="1" dirty="0"/>
+              <a:t>SPECIFIKACIJA</a:t>
+            </a:r>
+            <a:r>
+              <a:rPr lang="en-US" dirty="0"/>
+              <a:t/>
+            </a:r>
+            <a:br>
+              <a:rPr lang="en-US" dirty="0"/>
+            </a:br>
+            <a:r>
+              <a:rPr lang="en-US" sz="3100" i="1" dirty="0" err="1"/>
+              <a:t>Kako</a:t>
+            </a:r>
+            <a:r>
+              <a:rPr lang="sr-Latn-RS" sz="3100" i="1" dirty="0"/>
+              <a:t> program</a:t>
+            </a:r>
+            <a:r>
+              <a:rPr lang="en-US" sz="3100" i="1" dirty="0"/>
+              <a:t> </a:t>
+            </a:r>
+            <a:r>
+              <a:rPr lang="en-US" sz="3100" i="1" dirty="0" err="1"/>
+              <a:t>funkcioni</a:t>
+            </a:r>
+            <a:r>
+              <a:rPr lang="sr-Latn-RS" sz="3100" i="1" dirty="0"/>
+              <a:t>še?</a:t>
             </a:r>
             <a:endParaRPr lang="en-US" dirty="0"/>
           </a:p>
         </p:txBody>
       </p:sp>
-      <p:sp>
-        <p:nvSpPr>
-          <p:cNvPr id="6" name="Content Placeholder 5"/>
-          <p:cNvSpPr>
-            <a:spLocks noGrp="1"/>
-          </p:cNvSpPr>
-          <p:nvPr>
-            <p:ph idx="1"/>
-          </p:nvPr>
-        </p:nvSpPr>
-        <p:spPr/>
-        <p:txBody>
-          <a:bodyPr>
-            <a:noAutofit/>
-          </a:bodyPr>
-          <a:lstStyle/>
-          <a:p>
-            <a:pPr marL="0" indent="0">
-              <a:buNone/>
-            </a:pPr>
-            <a:r>
-              <a:rPr lang="sr-Latn-RS" sz="2500" dirty="0" smtClean="0"/>
-              <a:t>Opciono, uz korišćenje neuronske mreže:</a:t>
-            </a:r>
-          </a:p>
-          <a:p>
-            <a:r>
-              <a:rPr lang="sr-Latn-RS" sz="2500" dirty="0" smtClean="0"/>
-              <a:t>Prepoznavanje leve i desne šake</a:t>
-            </a:r>
-          </a:p>
-          <a:p>
-            <a:r>
-              <a:rPr lang="sr-Latn-RS" sz="2500" dirty="0" smtClean="0"/>
-              <a:t>Pomeranje kursora miša desnom šakom</a:t>
-            </a:r>
-          </a:p>
-          <a:p>
-            <a:r>
-              <a:rPr lang="sr-Latn-RS" sz="2500" dirty="0" smtClean="0"/>
-              <a:t>Manipulisanje prozorom aktivne aplikacije levom šakom</a:t>
-            </a:r>
-            <a:endParaRPr lang="en-US" sz="2500" dirty="0"/>
-          </a:p>
-        </p:txBody>
-      </p:sp>
+      <mc:AlternateContent xmlns:mc="http://schemas.openxmlformats.org/markup-compatibility/2006" xmlns:a14="http://schemas.microsoft.com/office/drawing/2010/main">
+        <mc:Choice Requires="a14">
+          <p:sp>
+            <p:nvSpPr>
+              <p:cNvPr id="3" name="Content Placeholder 2"/>
+              <p:cNvSpPr>
+                <a:spLocks noGrp="1"/>
+              </p:cNvSpPr>
+              <p:nvPr>
+                <p:ph idx="1"/>
+              </p:nvPr>
+            </p:nvSpPr>
+            <p:spPr/>
+            <p:txBody>
+              <a:bodyPr>
+                <a:normAutofit/>
+              </a:bodyPr>
+              <a:lstStyle/>
+              <a:p>
+                <a:pPr marL="514350" indent="-514350">
+                  <a:buFont typeface="+mj-lt"/>
+                  <a:buAutoNum type="arabicPeriod" startAt="3"/>
+                </a:pPr>
+                <a:r>
+                  <a:rPr lang="sr-Latn-RS" sz="2800" dirty="0" smtClean="0"/>
+                  <a:t>Snimak </a:t>
+                </a:r>
+                <a:r>
+                  <a:rPr lang="sr-Latn-RS" sz="2800" dirty="0"/>
+                  <a:t>se u pozadini softverski obrađuje, sa ciljem da se u frejmovima pronađe oblik koji predstavlja raširenu </a:t>
+                </a:r>
+                <a:r>
+                  <a:rPr lang="sr-Latn-RS" sz="2800" dirty="0" smtClean="0"/>
+                  <a:t>šaku</a:t>
+                </a:r>
+                <a:r>
+                  <a:rPr lang="sr-Latn-RS" sz="2800" dirty="0"/>
+                  <a:t>, ili da bar liči na nju</a:t>
+                </a:r>
+              </a:p>
+              <a:p>
+                <a:r>
+                  <a:rPr lang="en-US" sz="2000" dirty="0" err="1" smtClean="0"/>
+                  <a:t>Konverzija</a:t>
+                </a:r>
+                <a:r>
+                  <a:rPr lang="en-US" sz="2000" dirty="0" smtClean="0"/>
+                  <a:t> </a:t>
+                </a:r>
+                <a:r>
+                  <a:rPr lang="en-US" sz="2000" dirty="0" err="1" smtClean="0"/>
+                  <a:t>slike</a:t>
+                </a:r>
+                <a:r>
+                  <a:rPr lang="en-US" sz="2000" dirty="0" smtClean="0"/>
+                  <a:t> u </a:t>
+                </a:r>
+                <a:r>
+                  <a:rPr lang="en-US" sz="2000" dirty="0" err="1" smtClean="0"/>
+                  <a:t>grayscale</a:t>
+                </a:r>
+                <a:r>
+                  <a:rPr lang="en-US" sz="2000" dirty="0" smtClean="0"/>
+                  <a:t>, </a:t>
+                </a:r>
+                <a:r>
+                  <a:rPr lang="en-US" sz="2000" dirty="0" err="1" smtClean="0"/>
+                  <a:t>zamu</a:t>
+                </a:r>
+                <a:r>
+                  <a:rPr lang="sr-Latn-RS" sz="2000" dirty="0" smtClean="0"/>
+                  <a:t>ćivanje (GaussianBlur)</a:t>
+                </a:r>
+                <a:r>
+                  <a:rPr lang="en-US" sz="2000" dirty="0" smtClean="0"/>
+                  <a:t> da bi </a:t>
+                </a:r>
+                <a:r>
+                  <a:rPr lang="en-US" sz="2000" dirty="0" err="1" smtClean="0"/>
+                  <a:t>smo</a:t>
+                </a:r>
+                <a:r>
+                  <a:rPr lang="en-US" sz="2000" dirty="0" smtClean="0"/>
+                  <a:t> </a:t>
+                </a:r>
+                <a:r>
+                  <a:rPr lang="en-US" sz="2000" dirty="0" err="1" smtClean="0"/>
+                  <a:t>otklonili</a:t>
+                </a:r>
+                <a:r>
+                  <a:rPr lang="en-US" sz="2000" dirty="0" smtClean="0"/>
+                  <a:t> </a:t>
+                </a:r>
+                <a:r>
+                  <a:rPr lang="sr-Latn-RS" sz="2000" dirty="0" smtClean="0"/>
+                  <a:t>šum, </a:t>
+                </a:r>
+                <a:r>
+                  <a:rPr lang="en-US" sz="2000" dirty="0" smtClean="0"/>
+                  <a:t>pa </a:t>
+                </a:r>
+                <a:r>
+                  <a:rPr lang="en-US" sz="2000" dirty="0" err="1" smtClean="0"/>
+                  <a:t>binar</a:t>
+                </a:r>
+                <a:r>
+                  <a:rPr lang="sr-Latn-RS" sz="2000" dirty="0" smtClean="0"/>
+                  <a:t>izacija</a:t>
+                </a:r>
+              </a:p>
+              <a:p>
+                <a:pPr lvl="1"/>
+                <a:r>
+                  <a:rPr lang="sr-Latn-RS" sz="1600" dirty="0" smtClean="0"/>
+                  <a:t>GaussianBlur koristi Gaussian filter, tj filter čiji impulsni odziv (odziv sistema u funkciji vremena) predstavlja Gaussian (</a:t>
+                </a:r>
+                <a14:m>
+                  <m:oMath xmlns:m="http://schemas.openxmlformats.org/officeDocument/2006/math">
+                    <m:r>
+                      <a:rPr lang="en-US" sz="1600" b="0" i="1" smtClean="0">
+                        <a:latin typeface="Cambria Math"/>
+                      </a:rPr>
+                      <m:t>𝑓</m:t>
+                    </m:r>
+                    <m:d>
+                      <m:dPr>
+                        <m:ctrlPr>
+                          <a:rPr lang="en-US" sz="1600" b="0" i="1" smtClean="0">
+                            <a:latin typeface="Cambria Math"/>
+                          </a:rPr>
+                        </m:ctrlPr>
+                      </m:dPr>
+                      <m:e>
+                        <m:r>
+                          <a:rPr lang="en-US" sz="1600" b="0" i="1" smtClean="0">
+                            <a:latin typeface="Cambria Math"/>
+                          </a:rPr>
+                          <m:t>𝑥</m:t>
+                        </m:r>
+                      </m:e>
+                    </m:d>
+                    <m:r>
+                      <a:rPr lang="en-US" sz="1600" b="0" i="1" smtClean="0">
+                        <a:latin typeface="Cambria Math"/>
+                      </a:rPr>
+                      <m:t>=</m:t>
+                    </m:r>
+                    <m:r>
+                      <a:rPr lang="sr-Latn-RS" sz="1600" b="0" i="1" smtClean="0">
+                        <a:latin typeface="Cambria Math"/>
+                      </a:rPr>
+                      <m:t>𝑎</m:t>
+                    </m:r>
+                    <m:sSup>
+                      <m:sSupPr>
+                        <m:ctrlPr>
+                          <a:rPr lang="sr-Latn-RS" sz="1600" b="0" i="1" smtClean="0">
+                            <a:latin typeface="Cambria Math"/>
+                          </a:rPr>
+                        </m:ctrlPr>
+                      </m:sSupPr>
+                      <m:e>
+                        <m:r>
+                          <a:rPr lang="en-US" sz="1600" b="0" i="1" smtClean="0">
+                            <a:latin typeface="Cambria Math"/>
+                          </a:rPr>
+                          <m:t>𝑒</m:t>
+                        </m:r>
+                      </m:e>
+                      <m:sup>
+                        <m:r>
+                          <a:rPr lang="en-US" sz="1600" b="0" i="1" smtClean="0">
+                            <a:latin typeface="Cambria Math"/>
+                          </a:rPr>
+                          <m:t>−</m:t>
+                        </m:r>
+                        <m:f>
+                          <m:fPr>
+                            <m:ctrlPr>
+                              <a:rPr lang="sr-Latn-RS" sz="1600" b="0" i="1" smtClean="0">
+                                <a:latin typeface="Cambria Math"/>
+                              </a:rPr>
+                            </m:ctrlPr>
+                          </m:fPr>
+                          <m:num>
+                            <m:sSup>
+                              <m:sSupPr>
+                                <m:ctrlPr>
+                                  <a:rPr lang="sr-Latn-RS" sz="1600" b="0" i="1" smtClean="0">
+                                    <a:latin typeface="Cambria Math"/>
+                                  </a:rPr>
+                                </m:ctrlPr>
+                              </m:sSupPr>
+                              <m:e>
+                                <m:d>
+                                  <m:dPr>
+                                    <m:ctrlPr>
+                                      <a:rPr lang="sr-Latn-RS" sz="1600" b="0" i="1" smtClean="0">
+                                        <a:latin typeface="Cambria Math"/>
+                                      </a:rPr>
+                                    </m:ctrlPr>
+                                  </m:dPr>
+                                  <m:e>
+                                    <m:r>
+                                      <a:rPr lang="en-US" sz="1600" b="0" i="1" smtClean="0">
+                                        <a:latin typeface="Cambria Math"/>
+                                      </a:rPr>
+                                      <m:t>𝑥</m:t>
+                                    </m:r>
+                                    <m:r>
+                                      <a:rPr lang="en-US" sz="1600" b="0" i="1" smtClean="0">
+                                        <a:latin typeface="Cambria Math"/>
+                                      </a:rPr>
+                                      <m:t>−</m:t>
+                                    </m:r>
+                                    <m:r>
+                                      <a:rPr lang="en-US" sz="1600" b="0" i="1" smtClean="0">
+                                        <a:latin typeface="Cambria Math"/>
+                                      </a:rPr>
+                                      <m:t>𝑏</m:t>
+                                    </m:r>
+                                  </m:e>
+                                </m:d>
+                              </m:e>
+                              <m:sup>
+                                <m:r>
+                                  <a:rPr lang="en-US" sz="1600" b="0" i="1" smtClean="0">
+                                    <a:latin typeface="Cambria Math"/>
+                                  </a:rPr>
+                                  <m:t>2</m:t>
+                                </m:r>
+                              </m:sup>
+                            </m:sSup>
+                          </m:num>
+                          <m:den>
+                            <m:r>
+                              <a:rPr lang="sr-Latn-RS" sz="1600" b="0" i="1" smtClean="0">
+                                <a:latin typeface="Cambria Math"/>
+                              </a:rPr>
+                              <m:t>2</m:t>
+                            </m:r>
+                            <m:sSup>
+                              <m:sSupPr>
+                                <m:ctrlPr>
+                                  <a:rPr lang="en-US" sz="1600" b="0" i="1" smtClean="0">
+                                    <a:latin typeface="Cambria Math"/>
+                                  </a:rPr>
+                                </m:ctrlPr>
+                              </m:sSupPr>
+                              <m:e>
+                                <m:r>
+                                  <a:rPr lang="en-US" sz="1600" b="0" i="1" smtClean="0">
+                                    <a:latin typeface="Cambria Math"/>
+                                  </a:rPr>
+                                  <m:t>𝑐</m:t>
+                                </m:r>
+                              </m:e>
+                              <m:sup>
+                                <m:r>
+                                  <a:rPr lang="en-US" sz="1600" b="0" i="1" smtClean="0">
+                                    <a:latin typeface="Cambria Math"/>
+                                  </a:rPr>
+                                  <m:t>2</m:t>
+                                </m:r>
+                              </m:sup>
+                            </m:sSup>
+                          </m:den>
+                        </m:f>
+                      </m:sup>
+                    </m:sSup>
+                  </m:oMath>
+                </a14:m>
+                <a:r>
+                  <a:rPr lang="en-US" sz="1600" dirty="0" smtClean="0"/>
+                  <a:t>)</a:t>
+                </a:r>
+              </a:p>
+              <a:p>
+                <a:endParaRPr lang="sr-Latn-RS" sz="2000" dirty="0" smtClean="0"/>
+              </a:p>
+              <a:p>
+                <a:r>
+                  <a:rPr lang="en-US" sz="2000" dirty="0" err="1" smtClean="0"/>
+                  <a:t>Pronala</a:t>
+                </a:r>
+                <a:r>
+                  <a:rPr lang="sr-Latn-RS" sz="2000" dirty="0" smtClean="0"/>
+                  <a:t>ženje kontura na slici</a:t>
+                </a:r>
+              </a:p>
+              <a:p>
+                <a:pPr lvl="1"/>
+                <a:r>
+                  <a:rPr lang="sr-Latn-RS" sz="1600" i="1" dirty="0" smtClean="0"/>
+                  <a:t>cv2.findContours(img_bin, ...)</a:t>
+                </a:r>
+                <a:endParaRPr lang="en-US" sz="1600" i="1" dirty="0" smtClean="0"/>
+              </a:p>
+              <a:p>
+                <a:pPr lvl="1"/>
+                <a:r>
+                  <a:rPr lang="en-US" sz="1600" dirty="0" err="1" smtClean="0"/>
+                  <a:t>Funkcija</a:t>
+                </a:r>
+                <a:r>
+                  <a:rPr lang="en-US" sz="1600" dirty="0" smtClean="0"/>
+                  <a:t> </a:t>
+                </a:r>
+                <a:r>
+                  <a:rPr lang="sr-Latn-RS" sz="1600" dirty="0" smtClean="0"/>
+                  <a:t>će nam vratiti listu kontura, od kojih svaka predstavlja numpy array koordinata graničnih tačaka objekta u obliku (x, y)</a:t>
+                </a:r>
+              </a:p>
+            </p:txBody>
+          </p:sp>
+        </mc:Choice>
+        <mc:Fallback xmlns="">
+          <p:sp>
+            <p:nvSpPr>
+              <p:cNvPr id="3" name="Content Placeholder 2"/>
+              <p:cNvSpPr>
+                <a:spLocks noGrp="1" noRot="1" noChangeAspect="1" noMove="1" noResize="1" noEditPoints="1" noAdjustHandles="1" noChangeArrowheads="1" noChangeShapeType="1" noTextEdit="1"/>
+              </p:cNvSpPr>
+              <p:nvPr>
+                <p:ph idx="1"/>
+              </p:nvPr>
+            </p:nvSpPr>
+            <p:spPr>
+              <a:blipFill rotWithShape="1">
+                <a:blip r:embed="rId2"/>
+                <a:stretch>
+                  <a:fillRect l="-1481" t="-1348" r="-963"/>
+                </a:stretch>
+              </a:blipFill>
+            </p:spPr>
+            <p:txBody>
+              <a:bodyPr/>
+              <a:lstStyle/>
+              <a:p>
+                <a:r>
+                  <a:rPr lang="en-US">
+                    <a:noFill/>
+                  </a:rPr>
+                  <a:t> </a:t>
+                </a:r>
+              </a:p>
+            </p:txBody>
+          </p:sp>
+        </mc:Fallback>
+      </mc:AlternateContent>
     </p:spTree>
     <p:extLst>
       <p:ext uri="{BB962C8B-B14F-4D97-AF65-F5344CB8AC3E}">
-        <p14:creationId xmlns:p14="http://schemas.microsoft.com/office/powerpoint/2010/main" val="3632328996"/>
+        <p14:creationId xmlns:p14="http://schemas.microsoft.com/office/powerpoint/2010/main" val="1202819265"/>
       </p:ext>
     </p:extLst>
   </p:cSld>
   <p:clrMapOvr>
     <a:masterClrMapping/>
   </p:clrMapOvr>
+  <p:timing>
+    <p:tnLst>
+      <p:par>
+        <p:cTn id="1" dur="indefinite" restart="never" nodeType="tmRoot"/>
+      </p:par>
+    </p:tnLst>
+  </p:timing>
 </p:sld>
 </file>
 
@@ -3932,12 +5831,41 @@
         </p:nvSpPr>
         <p:spPr/>
         <p:txBody>
-          <a:bodyPr/>
-          <a:lstStyle/>
-          <a:p>
-            <a:r>
-              <a:rPr lang="sr-Latn-RS" dirty="0" smtClean="0"/>
-              <a:t>Motivacija</a:t>
+          <a:bodyPr>
+            <a:normAutofit fontScale="90000"/>
+          </a:bodyPr>
+          <a:lstStyle/>
+          <a:p>
+            <a:r>
+              <a:rPr lang="en-US" b="1" dirty="0"/>
+              <a:t>SPECIFIKACIJA</a:t>
+            </a:r>
+            <a:r>
+              <a:rPr lang="en-US" dirty="0"/>
+              <a:t/>
+            </a:r>
+            <a:br>
+              <a:rPr lang="en-US" dirty="0"/>
+            </a:br>
+            <a:r>
+              <a:rPr lang="en-US" sz="3100" i="1" dirty="0" err="1"/>
+              <a:t>Kako</a:t>
+            </a:r>
+            <a:r>
+              <a:rPr lang="sr-Latn-RS" sz="3100" i="1" dirty="0"/>
+              <a:t> program</a:t>
+            </a:r>
+            <a:r>
+              <a:rPr lang="en-US" sz="3100" i="1" dirty="0"/>
+              <a:t> </a:t>
+            </a:r>
+            <a:r>
+              <a:rPr lang="en-US" sz="3100" i="1" dirty="0" err="1"/>
+              <a:t>funkcioni</a:t>
+            </a:r>
+            <a:r>
+              <a:rPr lang="sr-Latn-RS" sz="3100" i="1" dirty="0"/>
+              <a:t>še?</a:t>
             </a:r>
             <a:endParaRPr lang="en-US" dirty="0"/>
           </a:p>
@@ -3955,47 +5883,154 @@
         </p:nvSpPr>
         <p:spPr/>
         <p:txBody>
-          <a:bodyPr/>
-          <a:lstStyle/>
-          <a:p>
-            <a:r>
-              <a:rPr lang="en-US" dirty="0" err="1" smtClean="0"/>
-              <a:t>Pomeranje</a:t>
-            </a:r>
-            <a:r>
-              <a:rPr lang="en-US" dirty="0" smtClean="0"/>
+          <a:bodyPr>
+            <a:normAutofit/>
+          </a:bodyPr>
+          <a:lstStyle/>
+          <a:p>
+            <a:pPr marL="514350" indent="-514350">
+              <a:buFont typeface="+mj-lt"/>
+              <a:buAutoNum type="arabicPeriod" startAt="3"/>
+            </a:pPr>
+            <a:r>
+              <a:rPr lang="sr-Latn-RS" sz="2800" dirty="0" smtClean="0"/>
+              <a:t>Snimak </a:t>
+            </a:r>
+            <a:r>
+              <a:rPr lang="sr-Latn-RS" sz="2800" dirty="0"/>
+              <a:t>se u pozadini softverski obrađuje, sa ciljem da se u frejmovima pronađe oblik koji predstavlja raširenu </a:t>
+            </a:r>
+            <a:r>
+              <a:rPr lang="sr-Latn-RS" sz="2800" dirty="0" smtClean="0"/>
+              <a:t>šaku</a:t>
+            </a:r>
+            <a:r>
+              <a:rPr lang="sr-Latn-RS" sz="2800" dirty="0"/>
+              <a:t>, ili da bar liči na </a:t>
+            </a:r>
+            <a:r>
+              <a:rPr lang="sr-Latn-RS" sz="2800" dirty="0" smtClean="0"/>
+              <a:t>nju</a:t>
+            </a:r>
+          </a:p>
+          <a:p>
+            <a:r>
+              <a:rPr lang="en-US" sz="2000" dirty="0" err="1"/>
+              <a:t>Odabir</a:t>
+            </a:r>
+            <a:r>
+              <a:rPr lang="en-US" sz="2000" dirty="0"/>
               <a:t> </a:t>
             </a:r>
             <a:r>
-              <a:rPr lang="en-US" dirty="0" err="1" smtClean="0"/>
-              <a:t>objekata</a:t>
-            </a:r>
-            <a:r>
-              <a:rPr lang="en-US" dirty="0" smtClean="0"/>
+              <a:rPr lang="en-US" sz="2000" dirty="0" err="1"/>
+              <a:t>odgovaraju</a:t>
+            </a:r>
+            <a:r>
+              <a:rPr lang="sr-Latn-RS" sz="2000" dirty="0"/>
+              <a:t>će konture</a:t>
+            </a:r>
+            <a:r>
+              <a:rPr lang="en-US" sz="2000" dirty="0"/>
+              <a:t> i </a:t>
+            </a:r>
+            <a:r>
+              <a:rPr lang="en-US" sz="2000" dirty="0" err="1"/>
+              <a:t>iscrtavanje</a:t>
+            </a:r>
+            <a:r>
+              <a:rPr lang="en-US" sz="2000" dirty="0"/>
               <a:t> </a:t>
             </a:r>
             <a:r>
-              <a:rPr lang="en-US" dirty="0" err="1" smtClean="0"/>
-              <a:t>kori</a:t>
-            </a:r>
-            <a:r>
-              <a:rPr lang="sr-Latn-RS" dirty="0" smtClean="0"/>
-              <a:t>šćenjem „sile“ u filmovima Star Wars (Force)</a:t>
-            </a:r>
-            <a:endParaRPr lang="en-US" dirty="0"/>
+              <a:rPr lang="sr-Latn-RS" sz="2000" dirty="0"/>
+              <a:t>iste na novu sliku</a:t>
+            </a:r>
+          </a:p>
+          <a:p>
+            <a:pPr lvl="1"/>
+            <a:r>
+              <a:rPr lang="sr-Latn-RS" sz="1600" dirty="0"/>
+              <a:t>Tražimo </a:t>
+            </a:r>
+            <a:r>
+              <a:rPr lang="en-US" sz="1600" dirty="0" err="1"/>
+              <a:t>kontur</a:t>
+            </a:r>
+            <a:r>
+              <a:rPr lang="sr-Latn-RS" sz="1600" dirty="0"/>
+              <a:t>u</a:t>
+            </a:r>
+            <a:r>
+              <a:rPr lang="en-US" sz="1600" dirty="0"/>
+              <a:t> </a:t>
+            </a:r>
+            <a:r>
+              <a:rPr lang="en-US" sz="1600" dirty="0" err="1"/>
+              <a:t>sa</a:t>
+            </a:r>
+            <a:r>
+              <a:rPr lang="en-US" sz="1600" dirty="0"/>
+              <a:t> </a:t>
+            </a:r>
+            <a:r>
+              <a:rPr lang="en-US" sz="1600" dirty="0" err="1"/>
+              <a:t>najve</a:t>
+            </a:r>
+            <a:r>
+              <a:rPr lang="sr-Latn-RS" sz="1600" dirty="0"/>
+              <a:t>ćom površinom</a:t>
+            </a:r>
+            <a:endParaRPr lang="sr-Latn-RS" sz="2800" dirty="0"/>
+          </a:p>
+          <a:p>
+            <a:endParaRPr lang="sr-Latn-RS" sz="2000" dirty="0" smtClean="0"/>
+          </a:p>
+          <a:p>
+            <a:r>
+              <a:rPr lang="sr-Latn-RS" sz="2000" dirty="0" smtClean="0"/>
+              <a:t>Prosleđivanje slike sa konturom obučenoj neuronskoj mreži</a:t>
+            </a:r>
+          </a:p>
+          <a:p>
+            <a:pPr lvl="1"/>
+            <a:r>
+              <a:rPr lang="en-US" sz="1600" dirty="0" err="1" smtClean="0"/>
+              <a:t>Neuronska</a:t>
+            </a:r>
+            <a:r>
+              <a:rPr lang="en-US" sz="1600" dirty="0" smtClean="0"/>
+              <a:t> </a:t>
+            </a:r>
+            <a:r>
+              <a:rPr lang="en-US" sz="1600" dirty="0" err="1" smtClean="0"/>
+              <a:t>mre</a:t>
+            </a:r>
+            <a:r>
+              <a:rPr lang="sr-Latn-RS" sz="1600" dirty="0" smtClean="0"/>
+              <a:t>ža će obraditi sliku i vratiti nam rezultat (da li je na slici šaka, i ako jeste, koja šaka i koja gestura su u pitanju, i koje su koordinate četvorougla koji opisuje konturu na određenoj slici)</a:t>
+            </a:r>
+            <a:endParaRPr lang="en-US" sz="1600" dirty="0" smtClean="0"/>
           </a:p>
         </p:txBody>
       </p:sp>
     </p:spTree>
     <p:extLst>
       <p:ext uri="{BB962C8B-B14F-4D97-AF65-F5344CB8AC3E}">
-        <p14:creationId xmlns:p14="http://schemas.microsoft.com/office/powerpoint/2010/main" val="958847051"/>
+        <p14:creationId xmlns:p14="http://schemas.microsoft.com/office/powerpoint/2010/main" val="3340575459"/>
       </p:ext>
     </p:extLst>
   </p:cSld>
   <p:clrMapOvr>
     <a:masterClrMapping/>
   </p:clrMapOvr>
+  <p:timing>
+    <p:tnLst>
+      <p:par>
+        <p:cTn id="1" dur="indefinite" restart="never" nodeType="tmRoot"/>
+      </p:par>
+    </p:tnLst>
+  </p:timing>
 </p:sld>
 </file>
 
@@ -4028,152 +6063,303 @@
         </p:nvSpPr>
         <p:spPr/>
         <p:txBody>
+          <a:bodyPr>
+            <a:normAutofit fontScale="90000"/>
+          </a:bodyPr>
+          <a:lstStyle/>
+          <a:p>
+            <a:r>
+              <a:rPr lang="en-US" b="1" dirty="0"/>
+              <a:t>SPECIFIKACIJA</a:t>
+            </a:r>
+            <a:r>
+              <a:rPr lang="en-US" dirty="0"/>
+              <a:t/>
+            </a:r>
+            <a:br>
+              <a:rPr lang="en-US" dirty="0"/>
+            </a:br>
+            <a:r>
+              <a:rPr lang="en-US" sz="3100" i="1" dirty="0" err="1"/>
+              <a:t>Kako</a:t>
+            </a:r>
+            <a:r>
+              <a:rPr lang="sr-Latn-RS" sz="3100" i="1" dirty="0"/>
+              <a:t> program</a:t>
+            </a:r>
+            <a:r>
+              <a:rPr lang="en-US" sz="3100" i="1" dirty="0"/>
+              <a:t> </a:t>
+            </a:r>
+            <a:r>
+              <a:rPr lang="en-US" sz="3100" i="1" dirty="0" err="1"/>
+              <a:t>funkcioni</a:t>
+            </a:r>
+            <a:r>
+              <a:rPr lang="sr-Latn-RS" sz="3100" i="1" dirty="0"/>
+              <a:t>še?</a:t>
+            </a:r>
+            <a:endParaRPr lang="en-US" dirty="0"/>
+          </a:p>
+        </p:txBody>
+      </p:sp>
+      <p:sp>
+        <p:nvSpPr>
+          <p:cNvPr id="3" name="Content Placeholder 2"/>
+          <p:cNvSpPr>
+            <a:spLocks noGrp="1"/>
+          </p:cNvSpPr>
+          <p:nvPr>
+            <p:ph idx="1"/>
+          </p:nvPr>
+        </p:nvSpPr>
+        <p:spPr/>
+        <p:txBody>
           <a:bodyPr/>
           <a:lstStyle/>
           <a:p>
-            <a:r>
-              <a:rPr lang="en-US" dirty="0" err="1" smtClean="0"/>
-              <a:t>Sli</a:t>
-            </a:r>
-            <a:r>
-              <a:rPr lang="sr-Latn-RS" dirty="0" smtClean="0"/>
-              <a:t>čna rešenja</a:t>
-            </a:r>
-            <a:endParaRPr lang="en-US" dirty="0"/>
-          </a:p>
-        </p:txBody>
-      </p:sp>
-      <p:sp>
-        <p:nvSpPr>
-          <p:cNvPr id="3" name="Content Placeholder 2"/>
-          <p:cNvSpPr>
-            <a:spLocks noGrp="1"/>
-          </p:cNvSpPr>
-          <p:nvPr>
-            <p:ph idx="1"/>
-          </p:nvPr>
-        </p:nvSpPr>
-        <p:spPr/>
-        <p:txBody>
-          <a:bodyPr/>
-          <a:lstStyle/>
-          <a:p>
-            <a:r>
-              <a:rPr lang="sr-Latn-RS" dirty="0" smtClean="0"/>
-              <a:t>Hovering Controls za smart telefone</a:t>
-            </a:r>
-          </a:p>
-          <a:p>
-            <a:pPr marL="0" indent="0">
-              <a:buNone/>
+            <a:pPr marL="514350" indent="-514350">
+              <a:buFont typeface="+mj-lt"/>
+              <a:buAutoNum type="arabicPeriod" startAt="4"/>
             </a:pPr>
             <a:r>
-              <a:rPr lang="en-US" sz="1600" dirty="0" smtClean="0">
-                <a:solidFill>
-                  <a:schemeClr val="accent1"/>
-                </a:solidFill>
-                <a:hlinkClick r:id="rId2"/>
-              </a:rPr>
-              <a:t>http</a:t>
-            </a:r>
-            <a:r>
-              <a:rPr lang="en-US" sz="1800" dirty="0" smtClean="0">
-                <a:solidFill>
-                  <a:schemeClr val="accent1"/>
-                </a:solidFill>
-                <a:hlinkClick r:id="rId2"/>
-              </a:rPr>
-              <a:t>://</a:t>
-            </a:r>
-            <a:r>
-              <a:rPr lang="en-US" sz="1600" dirty="0" smtClean="0">
-                <a:solidFill>
-                  <a:schemeClr val="accent1"/>
-                </a:solidFill>
-                <a:hlinkClick r:id="rId2"/>
-              </a:rPr>
-              <a:t>forum.xda-developers.com/showthread.php?t=2351974</a:t>
-            </a:r>
-            <a:endParaRPr lang="sr-Latn-RS" sz="1800" dirty="0" smtClean="0">
-              <a:solidFill>
-                <a:schemeClr val="accent1"/>
-              </a:solidFill>
-            </a:endParaRPr>
-          </a:p>
-          <a:p>
-            <a:pPr marL="0" indent="0">
-              <a:buNone/>
-            </a:pPr>
-            <a:r>
-              <a:rPr lang="en-US" sz="1600" dirty="0" smtClean="0">
-                <a:solidFill>
-                  <a:schemeClr val="accent1"/>
-                </a:solidFill>
-                <a:hlinkClick r:id="rId3"/>
-              </a:rPr>
-              <a:t>https://play.google.com/store/apps/details?id=com.golgorz.hoveringcontrols</a:t>
-            </a:r>
-            <a:endParaRPr lang="en-US" sz="1600" dirty="0" smtClean="0">
-              <a:solidFill>
-                <a:schemeClr val="accent1"/>
-              </a:solidFill>
-            </a:endParaRPr>
-          </a:p>
-          <a:p>
-            <a:r>
-              <a:rPr lang="sr-Latn-RS" dirty="0" smtClean="0"/>
-              <a:t>Samsung Smart TV Motion Control</a:t>
+              <a:rPr lang="sr-Latn-RS" sz="2800" dirty="0"/>
+              <a:t>Ako se šaka pojavi na snimku</a:t>
+            </a:r>
+            <a:r>
+              <a:rPr lang="sr-Latn-RS" sz="2800" dirty="0" smtClean="0"/>
+              <a:t>, </a:t>
+            </a:r>
+            <a:r>
+              <a:rPr lang="sr-Latn-RS" sz="2800" dirty="0"/>
+              <a:t>na osnovu </a:t>
+            </a:r>
+            <a:r>
+              <a:rPr lang="sr-Latn-RS" sz="2800" dirty="0" smtClean="0"/>
+              <a:t>koordinata četvorougla koji je opisuje proveravamo </a:t>
+            </a:r>
+            <a:r>
+              <a:rPr lang="sr-Latn-RS" sz="2800" dirty="0"/>
+              <a:t>da li se ona </a:t>
+            </a:r>
+            <a:r>
+              <a:rPr lang="sr-Latn-RS" sz="2800" dirty="0" smtClean="0"/>
+              <a:t>kreće</a:t>
+            </a:r>
+            <a:r>
+              <a:rPr lang="en-US" sz="2800" dirty="0" smtClean="0"/>
+              <a:t>, i </a:t>
+            </a:r>
+            <a:r>
+              <a:rPr lang="en-US" sz="2800" dirty="0" err="1" smtClean="0"/>
+              <a:t>ako</a:t>
+            </a:r>
+            <a:r>
+              <a:rPr lang="en-US" sz="2800" dirty="0" smtClean="0"/>
+              <a:t> se </a:t>
+            </a:r>
+            <a:r>
+              <a:rPr lang="en-US" sz="2800" dirty="0" err="1" smtClean="0"/>
+              <a:t>kre</a:t>
+            </a:r>
+            <a:r>
+              <a:rPr lang="sr-Latn-RS" sz="2800" dirty="0" smtClean="0"/>
+              <a:t>će, pomeramo kursor</a:t>
             </a:r>
             <a:endParaRPr lang="en-US" dirty="0" smtClean="0"/>
           </a:p>
           <a:p>
-            <a:pPr marL="0" indent="0">
-              <a:buNone/>
-            </a:pPr>
-            <a:r>
-              <a:rPr lang="en-US" sz="1600" dirty="0" smtClean="0">
-                <a:hlinkClick r:id="rId4"/>
-              </a:rPr>
-              <a:t>http://www.samsung.com/my/microsite/tv/2013_si/motion_control_ex_gesture.html</a:t>
-            </a:r>
-            <a:endParaRPr lang="en-US" sz="1600" dirty="0" smtClean="0"/>
-          </a:p>
-          <a:p>
-            <a:r>
-              <a:rPr lang="en-US" dirty="0" smtClean="0"/>
-              <a:t>Leap Motion</a:t>
-            </a:r>
-          </a:p>
-          <a:p>
-            <a:pPr marL="0" indent="0">
-              <a:buNone/>
-            </a:pPr>
-            <a:r>
-              <a:rPr lang="en-US" sz="1600" dirty="0" smtClean="0">
-                <a:hlinkClick r:id="rId5"/>
-              </a:rPr>
-              <a:t>https://www.leapmotion.com/</a:t>
-            </a:r>
-            <a:endParaRPr lang="en-US" sz="1600" dirty="0" smtClean="0"/>
-          </a:p>
-          <a:p>
-            <a:pPr marL="0" indent="0">
-              <a:buNone/>
-            </a:pPr>
-            <a:endParaRPr lang="en-US" dirty="0"/>
+            <a:r>
+              <a:rPr lang="en-US" sz="2000" dirty="0" err="1" smtClean="0"/>
+              <a:t>Uzimamo</a:t>
+            </a:r>
+            <a:r>
+              <a:rPr lang="en-US" sz="2000" dirty="0" smtClean="0"/>
+              <a:t> </a:t>
+            </a:r>
+            <a:r>
+              <a:rPr lang="en-US" sz="2000" dirty="0" err="1" smtClean="0"/>
+              <a:t>koordinate</a:t>
+            </a:r>
+            <a:r>
+              <a:rPr lang="en-US" sz="2000" dirty="0" smtClean="0"/>
+              <a:t> </a:t>
+            </a:r>
+            <a:r>
+              <a:rPr lang="sr-Latn-RS" sz="2000" dirty="0" smtClean="0"/>
+              <a:t>donje desne </a:t>
+            </a:r>
+            <a:r>
+              <a:rPr lang="en-US" sz="2000" dirty="0" smtClean="0"/>
+              <a:t>ta</a:t>
+            </a:r>
+            <a:r>
+              <a:rPr lang="sr-Latn-RS" sz="2000" dirty="0" smtClean="0"/>
+              <a:t>čke četvorougla</a:t>
+            </a:r>
+          </a:p>
+          <a:p>
+            <a:pPr lvl="1"/>
+            <a:r>
+              <a:rPr lang="es-ES" sz="1600" i="1" dirty="0"/>
+              <a:t>x1 = </a:t>
+            </a:r>
+            <a:r>
+              <a:rPr lang="es-ES" sz="1600" i="1" dirty="0" err="1"/>
+              <a:t>rectangle</a:t>
+            </a:r>
+            <a:r>
+              <a:rPr lang="es-ES" sz="1600" i="1" dirty="0"/>
+              <a:t>[0</a:t>
+            </a:r>
+            <a:r>
+              <a:rPr lang="es-ES" sz="1600" i="1" dirty="0" smtClean="0"/>
+              <a:t>][2]</a:t>
+            </a:r>
+          </a:p>
+          <a:p>
+            <a:pPr lvl="1"/>
+            <a:r>
+              <a:rPr lang="es-ES" sz="1600" i="1" dirty="0" smtClean="0"/>
+              <a:t>y1 </a:t>
+            </a:r>
+            <a:r>
+              <a:rPr lang="es-ES" sz="1600" i="1" dirty="0"/>
+              <a:t>= </a:t>
+            </a:r>
+            <a:r>
+              <a:rPr lang="es-ES" sz="1600" i="1" dirty="0" err="1"/>
+              <a:t>rectangle</a:t>
+            </a:r>
+            <a:r>
+              <a:rPr lang="es-ES" sz="1600" i="1" dirty="0"/>
+              <a:t>[0</a:t>
+            </a:r>
+            <a:r>
+              <a:rPr lang="es-ES" sz="1600" i="1" dirty="0" smtClean="0"/>
+              <a:t>][3]</a:t>
+            </a:r>
+            <a:endParaRPr lang="sr-Latn-RS" sz="1600" i="1" dirty="0" smtClean="0"/>
+          </a:p>
+          <a:p>
+            <a:r>
+              <a:rPr lang="sr-Latn-RS" sz="2000" dirty="0" smtClean="0"/>
+              <a:t>Oduzimamo ih od prethodno očitanih koordinata da dobijemo pomeraj</a:t>
+            </a:r>
+          </a:p>
+          <a:p>
+            <a:pPr lvl="1"/>
+            <a:r>
+              <a:rPr lang="en-US" sz="1600" i="1" dirty="0" err="1"/>
+              <a:t>move_x</a:t>
+            </a:r>
+            <a:r>
+              <a:rPr lang="en-US" sz="1600" i="1" dirty="0"/>
+              <a:t> = x1 - </a:t>
+            </a:r>
+            <a:r>
+              <a:rPr lang="en-US" sz="1600" i="1" dirty="0" smtClean="0"/>
+              <a:t>prev_x1</a:t>
+            </a:r>
+          </a:p>
+          <a:p>
+            <a:pPr lvl="1"/>
+            <a:r>
+              <a:rPr lang="en-US" sz="1600" i="1" dirty="0" err="1" smtClean="0"/>
+              <a:t>move_y</a:t>
+            </a:r>
+            <a:r>
+              <a:rPr lang="en-US" sz="1600" i="1" dirty="0" smtClean="0"/>
+              <a:t> </a:t>
+            </a:r>
+            <a:r>
+              <a:rPr lang="en-US" sz="1600" i="1" dirty="0"/>
+              <a:t>= y1 - prev_y1</a:t>
+            </a:r>
+            <a:endParaRPr lang="sr-Latn-RS" sz="1600" i="1" dirty="0" smtClean="0"/>
+          </a:p>
+          <a:p>
+            <a:r>
+              <a:rPr lang="en-US" sz="2000" dirty="0" err="1" smtClean="0"/>
+              <a:t>Ako</a:t>
+            </a:r>
+            <a:r>
+              <a:rPr lang="en-US" sz="2000" dirty="0" smtClean="0"/>
+              <a:t> </a:t>
+            </a:r>
+            <a:r>
+              <a:rPr lang="en-US" sz="2000" dirty="0" err="1" smtClean="0"/>
+              <a:t>postoji</a:t>
+            </a:r>
+            <a:r>
+              <a:rPr lang="en-US" sz="2000" dirty="0" smtClean="0"/>
+              <a:t> </a:t>
+            </a:r>
+            <a:r>
+              <a:rPr lang="en-US" sz="2000" dirty="0" err="1" smtClean="0"/>
+              <a:t>razlika</a:t>
+            </a:r>
+            <a:r>
+              <a:rPr lang="en-US" sz="2000" dirty="0" smtClean="0"/>
+              <a:t> u </a:t>
+            </a:r>
+            <a:r>
+              <a:rPr lang="en-US" sz="2000" dirty="0" err="1" smtClean="0"/>
+              <a:t>koordinatama</a:t>
+            </a:r>
+            <a:r>
+              <a:rPr lang="en-US" sz="2000" dirty="0" smtClean="0"/>
+              <a:t>, p</a:t>
+            </a:r>
+            <a:r>
+              <a:rPr lang="sr-Latn-RS" sz="2000" dirty="0" smtClean="0"/>
+              <a:t>omeramo kursor na novu poziciju</a:t>
+            </a:r>
+            <a:endParaRPr lang="en-US" sz="2000" dirty="0" smtClean="0"/>
+          </a:p>
+          <a:p>
+            <a:pPr lvl="1"/>
+            <a:r>
+              <a:rPr lang="en-US" sz="1600" i="1" dirty="0"/>
+              <a:t>win32api.SetCursorPos((</a:t>
+            </a:r>
+            <a:r>
+              <a:rPr lang="en-US" sz="1600" i="1" dirty="0" err="1"/>
+              <a:t>cursor_x</a:t>
+            </a:r>
+            <a:r>
+              <a:rPr lang="en-US" sz="1600" i="1" dirty="0"/>
+              <a:t>, </a:t>
+            </a:r>
+            <a:r>
+              <a:rPr lang="en-US" sz="1600" i="1" dirty="0" err="1"/>
+              <a:t>cursor_y</a:t>
+            </a:r>
+            <a:r>
+              <a:rPr lang="en-US" sz="1600" i="1" dirty="0"/>
+              <a:t>))</a:t>
+            </a:r>
+            <a:endParaRPr lang="sr-Latn-RS" sz="1600" i="1" dirty="0" smtClean="0"/>
           </a:p>
         </p:txBody>
       </p:sp>
     </p:spTree>
     <p:extLst>
       <p:ext uri="{BB962C8B-B14F-4D97-AF65-F5344CB8AC3E}">
-        <p14:creationId xmlns:p14="http://schemas.microsoft.com/office/powerpoint/2010/main" val="3989313053"/>
+        <p14:creationId xmlns:p14="http://schemas.microsoft.com/office/powerpoint/2010/main" val="1642854114"/>
       </p:ext>
     </p:extLst>
   </p:cSld>
   <p:clrMapOvr>
     <a:masterClrMapping/>
   </p:clrMapOvr>
+  <p:timing>
+    <p:tnLst>
+      <p:par>
+        <p:cTn id="1" dur="indefinite" restart="never" nodeType="tmRoot"/>
+      </p:par>
+    </p:tnLst>
+  </p:timing>
 </p:sld>
 </file>
 
@@ -4196,7 +6382,7 @@
       </p:grpSpPr>
       <p:sp>
         <p:nvSpPr>
-          <p:cNvPr id="2" name="Title 1"/>
+          <p:cNvPr id="5" name="Title 4"/>
           <p:cNvSpPr>
             <a:spLocks noGrp="1"/>
           </p:cNvSpPr>
@@ -4207,29 +6393,48 @@
         <p:spPr/>
         <p:txBody>
           <a:bodyPr>
-            <a:normAutofit/>
+            <a:normAutofit fontScale="90000"/>
           </a:bodyPr>
           <a:lstStyle/>
           <a:p>
             <a:r>
-              <a:rPr lang="en-US" dirty="0" err="1" smtClean="0"/>
-              <a:t>Koraci</a:t>
-            </a:r>
-            <a:r>
-              <a:rPr lang="en-US" dirty="0" smtClean="0"/>
+              <a:rPr lang="en-US" b="1" dirty="0"/>
+              <a:t>SPECIFIKACIJA</a:t>
+            </a:r>
+            <a:r>
+              <a:rPr lang="en-US" dirty="0"/>
+              <a:t/>
+            </a:r>
+            <a:br>
+              <a:rPr lang="en-US" dirty="0"/>
+            </a:br>
+            <a:r>
+              <a:rPr lang="en-US" sz="3100" i="1" dirty="0" err="1"/>
+              <a:t>Kako</a:t>
+            </a:r>
+            <a:r>
+              <a:rPr lang="sr-Latn-RS" sz="3100" i="1" dirty="0"/>
+              <a:t> program</a:t>
+            </a:r>
+            <a:r>
+              <a:rPr lang="en-US" sz="3100" i="1" dirty="0"/>
               <a:t> </a:t>
             </a:r>
             <a:r>
-              <a:rPr lang="en-US" dirty="0" err="1" smtClean="0"/>
-              <a:t>implementacije</a:t>
-            </a:r>
-            <a:endParaRPr lang="en-US" dirty="0"/>
-          </a:p>
-        </p:txBody>
-      </p:sp>
-      <p:sp>
-        <p:nvSpPr>
-          <p:cNvPr id="3" name="Content Placeholder 2"/>
+              <a:rPr lang="en-US" sz="3100" i="1" dirty="0" err="1"/>
+              <a:t>funkcioni</a:t>
+            </a:r>
+            <a:r>
+              <a:rPr lang="sr-Latn-RS" sz="3100" i="1" dirty="0"/>
+              <a:t>še?</a:t>
+            </a:r>
+            <a:endParaRPr lang="en-US" sz="3100" i="1" dirty="0"/>
+          </a:p>
+        </p:txBody>
+      </p:sp>
+      <p:sp>
+        <p:nvSpPr>
+          <p:cNvPr id="6" name="Content Placeholder 5"/>
           <p:cNvSpPr>
             <a:spLocks noGrp="1"/>
           </p:cNvSpPr>
@@ -4240,61 +6445,110 @@
         <p:spPr/>
         <p:txBody>
           <a:bodyPr>
-            <a:normAutofit/>
+            <a:noAutofit/>
           </a:bodyPr>
           <a:lstStyle/>
           <a:p>
-            <a:pPr marL="514350" indent="-514350">
+            <a:pPr marL="457200" indent="-457200">
               <a:buFont typeface="+mj-lt"/>
-              <a:buAutoNum type="arabicPeriod"/>
+              <a:buAutoNum type="arabicPeriod" startAt="5"/>
             </a:pPr>
             <a:r>
-              <a:rPr lang="en-US" dirty="0" err="1" smtClean="0"/>
-              <a:t>Zatra</a:t>
-            </a:r>
-            <a:r>
-              <a:rPr lang="sr-Latn-RS" dirty="0" smtClean="0"/>
-              <a:t>žiti od web kamere da počne da snima</a:t>
-            </a:r>
-          </a:p>
-          <a:p>
-            <a:pPr marL="514350" indent="-514350">
-              <a:buFont typeface="+mj-lt"/>
-              <a:buAutoNum type="arabicPeriod"/>
-            </a:pPr>
-            <a:r>
-              <a:rPr lang="sr-Latn-RS" dirty="0" smtClean="0"/>
-              <a:t>Čitati frejmove iz snimka kamere (realtime)</a:t>
-            </a:r>
-          </a:p>
-          <a:p>
-            <a:pPr marL="514350" indent="-514350">
-              <a:buFont typeface="+mj-lt"/>
-              <a:buAutoNum type="arabicPeriod"/>
-            </a:pPr>
-            <a:r>
-              <a:rPr lang="sr-Latn-RS" dirty="0" smtClean="0"/>
-              <a:t>Konvertovati svaki frejm u binarnu sliku</a:t>
-            </a:r>
-          </a:p>
-          <a:p>
-            <a:pPr marL="514350" indent="-514350">
-              <a:buFont typeface="+mj-lt"/>
-              <a:buAutoNum type="arabicPeriod"/>
-            </a:pPr>
-            <a:r>
-              <a:rPr lang="sr-Latn-RS" dirty="0" smtClean="0"/>
-              <a:t>Pronaći region od interesa (konveksnu „ljusku“ šake)</a:t>
-            </a:r>
-          </a:p>
-          <a:p>
-            <a:pPr marL="514350" indent="-514350">
-              <a:buFont typeface="+mj-lt"/>
-              <a:buAutoNum type="arabicPeriod"/>
-            </a:pPr>
-            <a:r>
-              <a:rPr lang="sr-Latn-RS" dirty="0" smtClean="0"/>
-              <a:t>Sračunati razlike u poziciji i veličini regiona između frejmova</a:t>
+              <a:rPr lang="sr-Latn-RS" sz="2400" dirty="0" smtClean="0"/>
+              <a:t>Ako šaka vrši neki gest (skupljena šaka/neki od prstiju šake...), vrši se programski pritisak levog (skupljen</a:t>
+            </a:r>
+            <a:r>
+              <a:rPr lang="en-US" sz="2400" dirty="0" smtClean="0"/>
+              <a:t>a </a:t>
+            </a:r>
+            <a:r>
+              <a:rPr lang="en-US" sz="2400" dirty="0" err="1" smtClean="0"/>
+              <a:t>cela</a:t>
+            </a:r>
+            <a:r>
+              <a:rPr lang="en-US" sz="2400" dirty="0" smtClean="0"/>
+              <a:t> </a:t>
+            </a:r>
+            <a:r>
+              <a:rPr lang="sr-Latn-RS" sz="2400" dirty="0" smtClean="0"/>
+              <a:t>šaka) ili desnog (palac nije skupljen) tastera miša</a:t>
+            </a:r>
+          </a:p>
+          <a:p>
+            <a:r>
+              <a:rPr lang="sr-Latn-RS" sz="2000" dirty="0" smtClean="0"/>
+              <a:t>Proveravamo rezultat koji je vratila neuronska mreža</a:t>
+            </a:r>
+          </a:p>
+          <a:p>
+            <a:pPr lvl="1"/>
+            <a:r>
+              <a:rPr lang="en-US" sz="1600" b="1" i="1" dirty="0"/>
+              <a:t>if </a:t>
+            </a:r>
+            <a:r>
+              <a:rPr lang="en-US" sz="1600" i="1" dirty="0" err="1"/>
+              <a:t>result.startswith</a:t>
+            </a:r>
+            <a:r>
+              <a:rPr lang="en-US" sz="1600" i="1" dirty="0" smtClean="0"/>
+              <a:t>(</a:t>
+            </a:r>
+            <a:r>
+              <a:rPr lang="sr-Latn-RS" sz="1600" i="1" dirty="0" smtClean="0"/>
+              <a:t>):</a:t>
+            </a:r>
+            <a:endParaRPr lang="en-US" sz="1600" i="1" dirty="0"/>
+          </a:p>
+          <a:p>
+            <a:r>
+              <a:rPr lang="en-US" sz="2000" dirty="0" smtClean="0"/>
+              <a:t>U </a:t>
+            </a:r>
+            <a:r>
+              <a:rPr lang="en-US" sz="2000" dirty="0" err="1" smtClean="0"/>
+              <a:t>zavisnosti</a:t>
+            </a:r>
+            <a:r>
+              <a:rPr lang="en-US" sz="2000" dirty="0" smtClean="0"/>
+              <a:t> </a:t>
+            </a:r>
+            <a:r>
+              <a:rPr lang="sr-Latn-RS" sz="2000" dirty="0" smtClean="0"/>
+              <a:t>od rezultata, vršimo određenu akciju</a:t>
+            </a:r>
+          </a:p>
+          <a:p>
+            <a:pPr lvl="1"/>
+            <a:r>
+              <a:rPr lang="en-US" sz="1600" dirty="0" smtClean="0"/>
+              <a:t>win32api.mouse_event()</a:t>
+            </a:r>
+            <a:endParaRPr lang="sr-Latn-RS" sz="1600" dirty="0" smtClean="0"/>
+          </a:p>
+          <a:p>
+            <a:r>
+              <a:rPr lang="sr-Latn-RS" sz="2000" dirty="0" smtClean="0"/>
+              <a:t>Ako se šaka pomera, čak i dok vrši gest, kursor će se takođe pomerati</a:t>
+            </a:r>
+          </a:p>
+          <a:p>
+            <a:r>
+              <a:rPr lang="sr-Latn-RS" sz="2000" dirty="0" smtClean="0"/>
+              <a:t>Ako se šaka vrati u prvobitno stanje (ne vrši gest), akcija se „poništava“</a:t>
+            </a:r>
+          </a:p>
+          <a:p>
+            <a:pPr lvl="1"/>
+            <a:r>
+              <a:rPr lang="sr-Latn-RS" sz="1600" dirty="0" smtClean="0"/>
+              <a:t>Npr. taster miša se otpusti</a:t>
+            </a:r>
+          </a:p>
+          <a:p>
+            <a:r>
+              <a:rPr lang="sr-Latn-RS" sz="2000" dirty="0" smtClean="0"/>
+              <a:t>asd</a:t>
             </a:r>
           </a:p>
         </p:txBody>
@@ -4302,13 +6556,20 @@
     </p:spTree>
     <p:extLst>
       <p:ext uri="{BB962C8B-B14F-4D97-AF65-F5344CB8AC3E}">
-        <p14:creationId xmlns:p14="http://schemas.microsoft.com/office/powerpoint/2010/main" val="1440826449"/>
+        <p14:creationId xmlns:p14="http://schemas.microsoft.com/office/powerpoint/2010/main" val="3741210957"/>
       </p:ext>
     </p:extLst>
   </p:cSld>
   <p:clrMapOvr>
     <a:masterClrMapping/>
   </p:clrMapOvr>
+  <p:timing>
+    <p:tnLst>
+      <p:par>
+        <p:cTn id="1" dur="indefinite" restart="never" nodeType="tmRoot"/>
+      </p:par>
+    </p:tnLst>
+  </p:timing>
 </p:sld>
 </file>
 
@@ -4331,7 +6592,7 @@
       </p:grpSpPr>
       <p:sp>
         <p:nvSpPr>
-          <p:cNvPr id="2" name="Title 1"/>
+          <p:cNvPr id="5" name="Title 4"/>
           <p:cNvSpPr>
             <a:spLocks noGrp="1"/>
           </p:cNvSpPr>
@@ -4341,20 +6602,37 @@
         </p:nvSpPr>
         <p:spPr/>
         <p:txBody>
-          <a:bodyPr/>
-          <a:lstStyle/>
-          <a:p>
-            <a:r>
-              <a:rPr lang="sr-Latn-RS" dirty="0" smtClean="0"/>
-              <a:t>Koraci implementacije</a:t>
-            </a:r>
-            <a:endParaRPr lang="en-US" dirty="0"/>
-          </a:p>
-        </p:txBody>
-      </p:sp>
-      <p:sp>
-        <p:nvSpPr>
-          <p:cNvPr id="3" name="Content Placeholder 2"/>
+          <a:bodyPr>
+            <a:normAutofit fontScale="90000"/>
+          </a:bodyPr>
+          <a:lstStyle/>
+          <a:p>
+            <a:r>
+              <a:rPr lang="en-US" b="1" dirty="0"/>
+              <a:t>SPECIFIKACIJA</a:t>
+            </a:r>
+            <a:r>
+              <a:rPr lang="en-US" dirty="0"/>
+              <a:t/>
+            </a:r>
+            <a:br>
+              <a:rPr lang="en-US" dirty="0"/>
+            </a:br>
+            <a:r>
+              <a:rPr lang="en-US" sz="2800" i="1" dirty="0" err="1" smtClean="0"/>
+              <a:t>Mogu</a:t>
+            </a:r>
+            <a:r>
+              <a:rPr lang="sr-Latn-RS" sz="2800" i="1" dirty="0" smtClean="0"/>
+              <a:t>ći dodaci</a:t>
+            </a:r>
+            <a:endParaRPr lang="en-US" i="1" dirty="0"/>
+          </a:p>
+        </p:txBody>
+      </p:sp>
+      <p:sp>
+        <p:nvSpPr>
+          <p:cNvPr id="6" name="Content Placeholder 5"/>
           <p:cNvSpPr>
             <a:spLocks noGrp="1"/>
           </p:cNvSpPr>
@@ -4364,41 +6642,42 @@
         </p:nvSpPr>
         <p:spPr/>
         <p:txBody>
-          <a:bodyPr/>
-          <a:lstStyle/>
-          <a:p>
-            <a:pPr marL="514350" indent="-514350">
-              <a:buFont typeface="+mj-lt"/>
-              <a:buAutoNum type="arabicPeriod" startAt="6"/>
-            </a:pPr>
-            <a:r>
-              <a:rPr lang="sr-Latn-RS" dirty="0" smtClean="0"/>
-              <a:t>Ako postoji razlika u poziciji, i veća je od minimalne granice za pomeraj, pomeri kursor miša za sračunatu razliku</a:t>
-            </a:r>
-          </a:p>
-          <a:p>
-            <a:pPr marL="514350" indent="-514350">
-              <a:buFont typeface="+mj-lt"/>
-              <a:buAutoNum type="arabicPeriod" startAt="6"/>
-            </a:pPr>
-            <a:r>
-              <a:rPr lang="sr-Latn-RS" dirty="0" smtClean="0"/>
-              <a:t>Ako postoji razlika u veličini, izvrši pritisak levog ili desnog tastera, u zavisnosti od veličine regiona (region za desni taster je širi od regiona za levi taster)</a:t>
-            </a:r>
-            <a:endParaRPr lang="en-US" dirty="0" smtClean="0"/>
+          <a:bodyPr>
+            <a:noAutofit/>
+          </a:bodyPr>
+          <a:lstStyle/>
+          <a:p>
+            <a:r>
+              <a:rPr lang="sr-Latn-RS" sz="2500" dirty="0" smtClean="0"/>
+              <a:t>Kontrolisanje kursora i akcija miša desnom šakom</a:t>
+            </a:r>
+          </a:p>
+          <a:p>
+            <a:r>
+              <a:rPr lang="sr-Latn-RS" sz="2500" dirty="0" smtClean="0"/>
+              <a:t>Manipulisanje prozorom aktivne aplikacije levom šakom</a:t>
+            </a:r>
+            <a:endParaRPr lang="en-US" sz="2500" dirty="0"/>
           </a:p>
         </p:txBody>
       </p:sp>
     </p:spTree>
     <p:extLst>
       <p:ext uri="{BB962C8B-B14F-4D97-AF65-F5344CB8AC3E}">
-        <p14:creationId xmlns:p14="http://schemas.microsoft.com/office/powerpoint/2010/main" val="3064637417"/>
+        <p14:creationId xmlns:p14="http://schemas.microsoft.com/office/powerpoint/2010/main" val="3632328996"/>
       </p:ext>
     </p:extLst>
   </p:cSld>
   <p:clrMapOvr>
     <a:masterClrMapping/>
   </p:clrMapOvr>
+  <p:timing>
+    <p:tnLst>
+      <p:par>
+        <p:cTn id="1" dur="indefinite" restart="never" nodeType="tmRoot"/>
+      </p:par>
+    </p:tnLst>
+  </p:timing>
 </p:sld>
 </file>
 

</xml_diff>